<commit_message>
Renomeia subsystems e PPT
- Acrescenta Energia final 2 e Households no PPT
</commit_message>
<xml_diff>
--- a/Documentação/1-Diagrama PPT/Cadeias Energéticas.pptx
+++ b/Documentação/1-Diagrama PPT/Cadeias Energéticas.pptx
@@ -209,7 +209,7 @@
           <a:p>
             <a:fld id="{F22EC251-D700-40B5-87D9-A45C9416D694}" type="datetimeFigureOut">
               <a:rPr lang="pt-BR" smtClean="0"/>
-              <a:t>03/10/2024</a:t>
+              <a:t>28/10/2024</a:t>
             </a:fld>
             <a:endParaRPr lang="pt-BR"/>
           </a:p>
@@ -830,7 +830,7 @@
             <a:fld id="{C11B6B41-91B8-4293-9633-874C21C369B6}" type="datetimeFigureOut">
               <a:rPr lang="pt-BR" smtClean="0"/>
               <a:pPr/>
-              <a:t>03/10/2024</a:t>
+              <a:t>28/10/2024</a:t>
             </a:fld>
             <a:endParaRPr lang="pt-BR"/>
           </a:p>
@@ -995,7 +995,7 @@
             <a:fld id="{C11B6B41-91B8-4293-9633-874C21C369B6}" type="datetimeFigureOut">
               <a:rPr lang="pt-BR" smtClean="0"/>
               <a:pPr/>
-              <a:t>03/10/2024</a:t>
+              <a:t>28/10/2024</a:t>
             </a:fld>
             <a:endParaRPr lang="pt-BR"/>
           </a:p>
@@ -1170,7 +1170,7 @@
             <a:fld id="{C11B6B41-91B8-4293-9633-874C21C369B6}" type="datetimeFigureOut">
               <a:rPr lang="pt-BR" smtClean="0"/>
               <a:pPr/>
-              <a:t>03/10/2024</a:t>
+              <a:t>28/10/2024</a:t>
             </a:fld>
             <a:endParaRPr lang="pt-BR"/>
           </a:p>
@@ -1335,7 +1335,7 @@
             <a:fld id="{C11B6B41-91B8-4293-9633-874C21C369B6}" type="datetimeFigureOut">
               <a:rPr lang="pt-BR" smtClean="0"/>
               <a:pPr/>
-              <a:t>03/10/2024</a:t>
+              <a:t>28/10/2024</a:t>
             </a:fld>
             <a:endParaRPr lang="pt-BR"/>
           </a:p>
@@ -1577,7 +1577,7 @@
             <a:fld id="{C11B6B41-91B8-4293-9633-874C21C369B6}" type="datetimeFigureOut">
               <a:rPr lang="pt-BR" smtClean="0"/>
               <a:pPr/>
-              <a:t>03/10/2024</a:t>
+              <a:t>28/10/2024</a:t>
             </a:fld>
             <a:endParaRPr lang="pt-BR"/>
           </a:p>
@@ -1859,7 +1859,7 @@
             <a:fld id="{C11B6B41-91B8-4293-9633-874C21C369B6}" type="datetimeFigureOut">
               <a:rPr lang="pt-BR" smtClean="0"/>
               <a:pPr/>
-              <a:t>03/10/2024</a:t>
+              <a:t>28/10/2024</a:t>
             </a:fld>
             <a:endParaRPr lang="pt-BR"/>
           </a:p>
@@ -2275,7 +2275,7 @@
             <a:fld id="{C11B6B41-91B8-4293-9633-874C21C369B6}" type="datetimeFigureOut">
               <a:rPr lang="pt-BR" smtClean="0"/>
               <a:pPr/>
-              <a:t>03/10/2024</a:t>
+              <a:t>28/10/2024</a:t>
             </a:fld>
             <a:endParaRPr lang="pt-BR"/>
           </a:p>
@@ -2389,7 +2389,7 @@
             <a:fld id="{C11B6B41-91B8-4293-9633-874C21C369B6}" type="datetimeFigureOut">
               <a:rPr lang="pt-BR" smtClean="0"/>
               <a:pPr/>
-              <a:t>03/10/2024</a:t>
+              <a:t>28/10/2024</a:t>
             </a:fld>
             <a:endParaRPr lang="pt-BR"/>
           </a:p>
@@ -2481,7 +2481,7 @@
             <a:fld id="{C11B6B41-91B8-4293-9633-874C21C369B6}" type="datetimeFigureOut">
               <a:rPr lang="pt-BR" smtClean="0"/>
               <a:pPr/>
-              <a:t>03/10/2024</a:t>
+              <a:t>28/10/2024</a:t>
             </a:fld>
             <a:endParaRPr lang="pt-BR"/>
           </a:p>
@@ -2753,7 +2753,7 @@
             <a:fld id="{C11B6B41-91B8-4293-9633-874C21C369B6}" type="datetimeFigureOut">
               <a:rPr lang="pt-BR" smtClean="0"/>
               <a:pPr/>
-              <a:t>03/10/2024</a:t>
+              <a:t>28/10/2024</a:t>
             </a:fld>
             <a:endParaRPr lang="pt-BR"/>
           </a:p>
@@ -3002,7 +3002,7 @@
             <a:fld id="{C11B6B41-91B8-4293-9633-874C21C369B6}" type="datetimeFigureOut">
               <a:rPr lang="pt-BR" smtClean="0"/>
               <a:pPr/>
-              <a:t>03/10/2024</a:t>
+              <a:t>28/10/2024</a:t>
             </a:fld>
             <a:endParaRPr lang="pt-BR"/>
           </a:p>
@@ -3210,7 +3210,7 @@
             <a:fld id="{C11B6B41-91B8-4293-9633-874C21C369B6}" type="datetimeFigureOut">
               <a:rPr lang="pt-BR" smtClean="0"/>
               <a:pPr/>
-              <a:t>03/10/2024</a:t>
+              <a:t>28/10/2024</a:t>
             </a:fld>
             <a:endParaRPr lang="pt-BR"/>
           </a:p>
@@ -5565,7 +5565,7 @@
         </p:nvSpPr>
         <p:spPr bwMode="auto">
           <a:xfrm>
-            <a:off x="7848600" y="2635250"/>
+            <a:off x="7848600" y="1644650"/>
             <a:ext cx="1028700" cy="542925"/>
           </a:xfrm>
           <a:prstGeom prst="rect">
@@ -5843,8 +5843,8 @@
         </p:nvCxnSpPr>
         <p:spPr bwMode="auto">
           <a:xfrm>
-            <a:off x="7429500" y="1916112"/>
-            <a:ext cx="419100" cy="990600"/>
+            <a:off x="7429500" y="1916113"/>
+            <a:ext cx="419100" cy="12700"/>
           </a:xfrm>
           <a:prstGeom prst="bentConnector3">
             <a:avLst>
@@ -6619,6 +6619,484 @@
           </a:ln>
         </p:spPr>
       </p:cxnSp>
+      <p:sp>
+        <p:nvSpPr>
+          <p:cNvPr id="21" name="Rectangle 235">
+            <a:extLst>
+              <a:ext uri="{FF2B5EF4-FFF2-40B4-BE49-F238E27FC236}">
+                <a16:creationId xmlns:a16="http://schemas.microsoft.com/office/drawing/2014/main" id="{05910AEC-7ED2-6633-952C-07C383B5167F}"/>
+              </a:ext>
+            </a:extLst>
+          </p:cNvPr>
+          <p:cNvSpPr>
+            <a:spLocks noChangeArrowheads="1"/>
+          </p:cNvSpPr>
+          <p:nvPr/>
+        </p:nvSpPr>
+        <p:spPr bwMode="auto">
+          <a:xfrm>
+            <a:off x="9156700" y="1268760"/>
+            <a:ext cx="1028700" cy="542925"/>
+          </a:xfrm>
+          <a:prstGeom prst="rect">
+            <a:avLst/>
+          </a:prstGeom>
+          <a:solidFill>
+            <a:schemeClr val="tx2">
+              <a:lumMod val="40000"/>
+              <a:lumOff val="60000"/>
+            </a:schemeClr>
+          </a:solidFill>
+          <a:ln w="9525">
+            <a:solidFill>
+              <a:schemeClr val="tx1"/>
+            </a:solidFill>
+            <a:miter lim="800000"/>
+            <a:headEnd/>
+            <a:tailEnd/>
+          </a:ln>
+        </p:spPr>
+        <p:txBody>
+          <a:bodyPr wrap="none" anchor="ctr"/>
+          <a:lstStyle/>
+          <a:p>
+            <a:pPr algn="ctr"/>
+            <a:endParaRPr lang="en-US" sz="1400" dirty="0">
+              <a:latin typeface="Times New Roman" pitchFamily="18" charset="0"/>
+            </a:endParaRPr>
+          </a:p>
+          <a:p>
+            <a:pPr algn="ctr"/>
+            <a:r>
+              <a:rPr lang="en-US" sz="1400" dirty="0">
+                <a:latin typeface="Times New Roman" pitchFamily="18" charset="0"/>
+              </a:rPr>
+              <a:t>Residencial</a:t>
+            </a:r>
+          </a:p>
+          <a:p>
+            <a:pPr algn="ctr"/>
+            <a:endParaRPr lang="pt-BR" sz="1400" dirty="0">
+              <a:latin typeface="Times New Roman" pitchFamily="18" charset="0"/>
+            </a:endParaRPr>
+          </a:p>
+        </p:txBody>
+      </p:sp>
+      <p:sp>
+        <p:nvSpPr>
+          <p:cNvPr id="22" name="Rectangle 235">
+            <a:extLst>
+              <a:ext uri="{FF2B5EF4-FFF2-40B4-BE49-F238E27FC236}">
+                <a16:creationId xmlns:a16="http://schemas.microsoft.com/office/drawing/2014/main" id="{40F344D6-6D57-4091-8CE2-0C6402FB35B0}"/>
+              </a:ext>
+            </a:extLst>
+          </p:cNvPr>
+          <p:cNvSpPr>
+            <a:spLocks noChangeArrowheads="1"/>
+          </p:cNvSpPr>
+          <p:nvPr/>
+        </p:nvSpPr>
+        <p:spPr bwMode="auto">
+          <a:xfrm>
+            <a:off x="9246950" y="2228427"/>
+            <a:ext cx="1028700" cy="542925"/>
+          </a:xfrm>
+          <a:prstGeom prst="rect">
+            <a:avLst/>
+          </a:prstGeom>
+          <a:solidFill>
+            <a:schemeClr val="tx2">
+              <a:lumMod val="40000"/>
+              <a:lumOff val="60000"/>
+            </a:schemeClr>
+          </a:solidFill>
+          <a:ln w="9525">
+            <a:solidFill>
+              <a:schemeClr val="tx1"/>
+            </a:solidFill>
+            <a:prstDash val="dash"/>
+            <a:miter lim="800000"/>
+            <a:headEnd/>
+            <a:tailEnd/>
+          </a:ln>
+        </p:spPr>
+        <p:txBody>
+          <a:bodyPr wrap="none" anchor="ctr"/>
+          <a:lstStyle/>
+          <a:p>
+            <a:pPr algn="ctr"/>
+            <a:endParaRPr lang="en-US" sz="1400" dirty="0">
+              <a:latin typeface="Times New Roman" pitchFamily="18" charset="0"/>
+            </a:endParaRPr>
+          </a:p>
+          <a:p>
+            <a:pPr algn="ctr"/>
+            <a:r>
+              <a:rPr lang="en-US" sz="1400" dirty="0">
+                <a:latin typeface="Times New Roman" pitchFamily="18" charset="0"/>
+              </a:rPr>
+              <a:t>Industrial</a:t>
+            </a:r>
+          </a:p>
+          <a:p>
+            <a:pPr algn="ctr"/>
+            <a:endParaRPr lang="pt-BR" sz="1400" dirty="0">
+              <a:latin typeface="Times New Roman" pitchFamily="18" charset="0"/>
+            </a:endParaRPr>
+          </a:p>
+        </p:txBody>
+      </p:sp>
+      <p:sp>
+        <p:nvSpPr>
+          <p:cNvPr id="23" name="Text Box 30">
+            <a:extLst>
+              <a:ext uri="{FF2B5EF4-FFF2-40B4-BE49-F238E27FC236}">
+                <a16:creationId xmlns:a16="http://schemas.microsoft.com/office/drawing/2014/main" id="{17C75CF6-AA7D-8594-48D9-DF2F6AA0D9F4}"/>
+              </a:ext>
+            </a:extLst>
+          </p:cNvPr>
+          <p:cNvSpPr txBox="1">
+            <a:spLocks noChangeArrowheads="1"/>
+          </p:cNvSpPr>
+          <p:nvPr/>
+        </p:nvSpPr>
+        <p:spPr bwMode="auto">
+          <a:xfrm>
+            <a:off x="9028112" y="-77788"/>
+            <a:ext cx="1520552" cy="274638"/>
+          </a:xfrm>
+          <a:prstGeom prst="rect">
+            <a:avLst/>
+          </a:prstGeom>
+          <a:noFill/>
+          <a:ln w="9525">
+            <a:noFill/>
+            <a:miter lim="800000"/>
+            <a:headEnd/>
+            <a:tailEnd/>
+          </a:ln>
+        </p:spPr>
+        <p:txBody>
+          <a:bodyPr/>
+          <a:lstStyle/>
+          <a:p>
+            <a:pPr algn="ctr"/>
+            <a:r>
+              <a:rPr lang="en-US" sz="1300" b="1" dirty="0" err="1">
+                <a:latin typeface="Times New Roman" pitchFamily="18" charset="0"/>
+              </a:rPr>
+              <a:t>Energia</a:t>
+            </a:r>
+            <a:r>
+              <a:rPr lang="en-US" sz="1300" b="1" dirty="0">
+                <a:latin typeface="Times New Roman" pitchFamily="18" charset="0"/>
+              </a:rPr>
+              <a:t> Final (2)</a:t>
+            </a:r>
+          </a:p>
+        </p:txBody>
+      </p:sp>
+      <p:sp>
+        <p:nvSpPr>
+          <p:cNvPr id="24" name="Rectangle 235">
+            <a:extLst>
+              <a:ext uri="{FF2B5EF4-FFF2-40B4-BE49-F238E27FC236}">
+                <a16:creationId xmlns:a16="http://schemas.microsoft.com/office/drawing/2014/main" id="{B5F29337-40FF-6DEC-77CA-A17394D789CF}"/>
+              </a:ext>
+            </a:extLst>
+          </p:cNvPr>
+          <p:cNvSpPr>
+            <a:spLocks noChangeArrowheads="1"/>
+          </p:cNvSpPr>
+          <p:nvPr/>
+        </p:nvSpPr>
+        <p:spPr bwMode="auto">
+          <a:xfrm>
+            <a:off x="10692680" y="1272186"/>
+            <a:ext cx="1028700" cy="542925"/>
+          </a:xfrm>
+          <a:prstGeom prst="rect">
+            <a:avLst/>
+          </a:prstGeom>
+          <a:solidFill>
+            <a:schemeClr val="tx2">
+              <a:lumMod val="40000"/>
+              <a:lumOff val="60000"/>
+            </a:schemeClr>
+          </a:solidFill>
+          <a:ln w="9525">
+            <a:solidFill>
+              <a:schemeClr val="tx1"/>
+            </a:solidFill>
+            <a:miter lim="800000"/>
+            <a:headEnd/>
+            <a:tailEnd/>
+          </a:ln>
+        </p:spPr>
+        <p:txBody>
+          <a:bodyPr wrap="none" anchor="ctr"/>
+          <a:lstStyle/>
+          <a:p>
+            <a:pPr algn="ctr"/>
+            <a:endParaRPr lang="en-US" sz="1400" dirty="0">
+              <a:latin typeface="Times New Roman" pitchFamily="18" charset="0"/>
+            </a:endParaRPr>
+          </a:p>
+          <a:p>
+            <a:pPr algn="ctr"/>
+            <a:r>
+              <a:rPr lang="en-US" sz="1400" dirty="0" err="1">
+                <a:latin typeface="Times New Roman" pitchFamily="18" charset="0"/>
+              </a:rPr>
+              <a:t>Iluminação</a:t>
+            </a:r>
+            <a:endParaRPr lang="en-US" sz="1400" dirty="0">
+              <a:latin typeface="Times New Roman" pitchFamily="18" charset="0"/>
+            </a:endParaRPr>
+          </a:p>
+          <a:p>
+            <a:pPr algn="ctr"/>
+            <a:endParaRPr lang="pt-BR" sz="1400" dirty="0">
+              <a:latin typeface="Times New Roman" pitchFamily="18" charset="0"/>
+            </a:endParaRPr>
+          </a:p>
+        </p:txBody>
+      </p:sp>
+      <p:sp>
+        <p:nvSpPr>
+          <p:cNvPr id="25" name="Rectangle 235">
+            <a:extLst>
+              <a:ext uri="{FF2B5EF4-FFF2-40B4-BE49-F238E27FC236}">
+                <a16:creationId xmlns:a16="http://schemas.microsoft.com/office/drawing/2014/main" id="{7259CF8B-F00E-85D0-F816-FDF1F0BFAC7B}"/>
+              </a:ext>
+            </a:extLst>
+          </p:cNvPr>
+          <p:cNvSpPr>
+            <a:spLocks noChangeArrowheads="1"/>
+          </p:cNvSpPr>
+          <p:nvPr/>
+        </p:nvSpPr>
+        <p:spPr bwMode="auto">
+          <a:xfrm>
+            <a:off x="10692680" y="2188201"/>
+            <a:ext cx="1028700" cy="542925"/>
+          </a:xfrm>
+          <a:prstGeom prst="rect">
+            <a:avLst/>
+          </a:prstGeom>
+          <a:solidFill>
+            <a:schemeClr val="tx2">
+              <a:lumMod val="40000"/>
+              <a:lumOff val="60000"/>
+            </a:schemeClr>
+          </a:solidFill>
+          <a:ln w="9525">
+            <a:solidFill>
+              <a:schemeClr val="tx1"/>
+            </a:solidFill>
+            <a:prstDash val="dash"/>
+            <a:miter lim="800000"/>
+            <a:headEnd/>
+            <a:tailEnd/>
+          </a:ln>
+        </p:spPr>
+        <p:txBody>
+          <a:bodyPr wrap="none" anchor="ctr"/>
+          <a:lstStyle/>
+          <a:p>
+            <a:pPr algn="ctr"/>
+            <a:endParaRPr lang="en-US" sz="1400" dirty="0">
+              <a:latin typeface="Times New Roman" pitchFamily="18" charset="0"/>
+            </a:endParaRPr>
+          </a:p>
+          <a:p>
+            <a:pPr algn="ctr"/>
+            <a:r>
+              <a:rPr lang="en-US" sz="1400" dirty="0" err="1">
+                <a:latin typeface="Times New Roman" pitchFamily="18" charset="0"/>
+              </a:rPr>
+              <a:t>Aquecimento</a:t>
+            </a:r>
+            <a:endParaRPr lang="en-US" sz="1400" dirty="0">
+              <a:latin typeface="Times New Roman" pitchFamily="18" charset="0"/>
+            </a:endParaRPr>
+          </a:p>
+          <a:p>
+            <a:pPr algn="ctr"/>
+            <a:endParaRPr lang="pt-BR" sz="1400" dirty="0">
+              <a:latin typeface="Times New Roman" pitchFamily="18" charset="0"/>
+            </a:endParaRPr>
+          </a:p>
+        </p:txBody>
+      </p:sp>
+      <p:sp>
+        <p:nvSpPr>
+          <p:cNvPr id="26" name="CaixaDeTexto 25">
+            <a:extLst>
+              <a:ext uri="{FF2B5EF4-FFF2-40B4-BE49-F238E27FC236}">
+                <a16:creationId xmlns:a16="http://schemas.microsoft.com/office/drawing/2014/main" id="{652AD306-5DEC-A07E-31BE-69FD83D1558C}"/>
+              </a:ext>
+            </a:extLst>
+          </p:cNvPr>
+          <p:cNvSpPr txBox="1"/>
+          <p:nvPr/>
+        </p:nvSpPr>
+        <p:spPr>
+          <a:xfrm>
+            <a:off x="10041395" y="2698112"/>
+            <a:ext cx="972702" cy="369332"/>
+          </a:xfrm>
+          <a:prstGeom prst="rect">
+            <a:avLst/>
+          </a:prstGeom>
+          <a:noFill/>
+        </p:spPr>
+        <p:txBody>
+          <a:bodyPr wrap="none" rtlCol="0">
+            <a:spAutoFit/>
+          </a:bodyPr>
+          <a:lstStyle/>
+          <a:p>
+            <a:r>
+              <a:rPr lang="pt-BR" dirty="0"/>
+              <a:t>FUTURO</a:t>
+            </a:r>
+          </a:p>
+        </p:txBody>
+      </p:sp>
+      <p:cxnSp>
+        <p:nvCxnSpPr>
+          <p:cNvPr id="27" name="AutoShape 271">
+            <a:extLst>
+              <a:ext uri="{FF2B5EF4-FFF2-40B4-BE49-F238E27FC236}">
+                <a16:creationId xmlns:a16="http://schemas.microsoft.com/office/drawing/2014/main" id="{72105202-5E9F-C5E5-FE66-BAF4DBA44610}"/>
+              </a:ext>
+            </a:extLst>
+          </p:cNvPr>
+          <p:cNvCxnSpPr>
+            <a:cxnSpLocks noChangeShapeType="1"/>
+            <a:stCxn id="43" idx="3"/>
+            <a:endCxn id="21" idx="1"/>
+          </p:cNvCxnSpPr>
+          <p:nvPr/>
+        </p:nvCxnSpPr>
+        <p:spPr bwMode="auto">
+          <a:xfrm flipV="1">
+            <a:off x="8877300" y="1540223"/>
+            <a:ext cx="279400" cy="375890"/>
+          </a:xfrm>
+          <a:prstGeom prst="bentConnector3">
+            <a:avLst>
+              <a:gd name="adj1" fmla="val 50000"/>
+            </a:avLst>
+          </a:prstGeom>
+          <a:noFill/>
+          <a:ln w="9525">
+            <a:solidFill>
+              <a:schemeClr val="tx1"/>
+            </a:solidFill>
+            <a:miter lim="800000"/>
+            <a:headEnd/>
+            <a:tailEnd type="triangle" w="med" len="med"/>
+          </a:ln>
+        </p:spPr>
+      </p:cxnSp>
+      <p:cxnSp>
+        <p:nvCxnSpPr>
+          <p:cNvPr id="30" name="AutoShape 271">
+            <a:extLst>
+              <a:ext uri="{FF2B5EF4-FFF2-40B4-BE49-F238E27FC236}">
+                <a16:creationId xmlns:a16="http://schemas.microsoft.com/office/drawing/2014/main" id="{A684C42A-7B08-3F5D-2737-27EDC71584E5}"/>
+              </a:ext>
+            </a:extLst>
+          </p:cNvPr>
+          <p:cNvCxnSpPr>
+            <a:cxnSpLocks noChangeShapeType="1"/>
+            <a:stCxn id="21" idx="3"/>
+            <a:endCxn id="24" idx="1"/>
+          </p:cNvCxnSpPr>
+          <p:nvPr/>
+        </p:nvCxnSpPr>
+        <p:spPr bwMode="auto">
+          <a:xfrm>
+            <a:off x="10185400" y="1540223"/>
+            <a:ext cx="507280" cy="3426"/>
+          </a:xfrm>
+          <a:prstGeom prst="bentConnector3">
+            <a:avLst>
+              <a:gd name="adj1" fmla="val 50000"/>
+            </a:avLst>
+          </a:prstGeom>
+          <a:noFill/>
+          <a:ln w="9525">
+            <a:solidFill>
+              <a:schemeClr val="tx1"/>
+            </a:solidFill>
+            <a:miter lim="800000"/>
+            <a:headEnd/>
+            <a:tailEnd type="triangle" w="med" len="med"/>
+          </a:ln>
+        </p:spPr>
+      </p:cxnSp>
+      <p:sp>
+        <p:nvSpPr>
+          <p:cNvPr id="37" name="Text Box 30">
+            <a:extLst>
+              <a:ext uri="{FF2B5EF4-FFF2-40B4-BE49-F238E27FC236}">
+                <a16:creationId xmlns:a16="http://schemas.microsoft.com/office/drawing/2014/main" id="{21524AA4-D6B5-813B-E23E-59F1FC8B61D0}"/>
+              </a:ext>
+            </a:extLst>
+          </p:cNvPr>
+          <p:cNvSpPr txBox="1">
+            <a:spLocks noChangeArrowheads="1"/>
+          </p:cNvSpPr>
+          <p:nvPr/>
+        </p:nvSpPr>
+        <p:spPr bwMode="auto">
+          <a:xfrm>
+            <a:off x="10439040" y="-63500"/>
+            <a:ext cx="1520552" cy="274638"/>
+          </a:xfrm>
+          <a:prstGeom prst="rect">
+            <a:avLst/>
+          </a:prstGeom>
+          <a:noFill/>
+          <a:ln w="9525">
+            <a:noFill/>
+            <a:miter lim="800000"/>
+            <a:headEnd/>
+            <a:tailEnd/>
+          </a:ln>
+        </p:spPr>
+        <p:txBody>
+          <a:bodyPr/>
+          <a:lstStyle/>
+          <a:p>
+            <a:pPr algn="ctr"/>
+            <a:r>
+              <a:rPr lang="en-US" sz="1300" b="1" dirty="0" err="1">
+                <a:latin typeface="Times New Roman" pitchFamily="18" charset="0"/>
+              </a:rPr>
+              <a:t>Energia</a:t>
+            </a:r>
+            <a:r>
+              <a:rPr lang="en-US" sz="1300" b="1" dirty="0">
+                <a:latin typeface="Times New Roman" pitchFamily="18" charset="0"/>
+              </a:rPr>
+              <a:t> </a:t>
+            </a:r>
+            <a:r>
+              <a:rPr lang="en-US" sz="1300" b="1" dirty="0" err="1">
+                <a:latin typeface="Times New Roman" pitchFamily="18" charset="0"/>
+              </a:rPr>
+              <a:t>Útil</a:t>
+            </a:r>
+            <a:endParaRPr lang="en-US" sz="1300" b="1" dirty="0">
+              <a:latin typeface="Times New Roman" pitchFamily="18" charset="0"/>
+            </a:endParaRPr>
+          </a:p>
+        </p:txBody>
+      </p:sp>
     </p:spTree>
     <p:extLst>
       <p:ext uri="{BB962C8B-B14F-4D97-AF65-F5344CB8AC3E}">

</xml_diff>

<commit_message>
Add Housing como Energia Final
Alteração nas tecnologias.

(tec):
- grid-->housing-->bulb

(commodity):
- electricity --(tec)--> electricity --(tec)--> electric households --(tec)--> electric households
</commit_message>
<xml_diff>
--- a/Documentação/1-Diagrama PPT/Cadeias Energéticas.pptx
+++ b/Documentação/1-Diagrama PPT/Cadeias Energéticas.pptx
@@ -5,14 +5,12 @@
     <p:sldMasterId id="2147483648" r:id="rId1"/>
   </p:sldMasterIdLst>
   <p:notesMasterIdLst>
-    <p:notesMasterId r:id="rId7"/>
+    <p:notesMasterId r:id="rId5"/>
   </p:notesMasterIdLst>
   <p:sldIdLst>
     <p:sldId id="260" r:id="rId2"/>
     <p:sldId id="259" r:id="rId3"/>
     <p:sldId id="261" r:id="rId4"/>
-    <p:sldId id="263" r:id="rId5"/>
-    <p:sldId id="262" r:id="rId6"/>
   </p:sldIdLst>
   <p:sldSz cx="12192000" cy="6858000"/>
   <p:notesSz cx="6858000" cy="9144000"/>
@@ -741,180 +739,6 @@
     <p:extLst>
       <p:ext uri="{BB962C8B-B14F-4D97-AF65-F5344CB8AC3E}">
         <p14:creationId xmlns:p14="http://schemas.microsoft.com/office/powerpoint/2010/main" val="3586815450"/>
-      </p:ext>
-    </p:extLst>
-  </p:cSld>
-  <p:clrMapOvr>
-    <a:masterClrMapping/>
-  </p:clrMapOvr>
-</p:notes>
-</file>
-
-<file path=ppt/notesSlides/notesSlide4.xml><?xml version="1.0" encoding="utf-8"?>
-<p:notes xmlns:a="http://schemas.openxmlformats.org/drawingml/2006/main" xmlns:r="http://schemas.openxmlformats.org/officeDocument/2006/relationships" xmlns:p="http://schemas.openxmlformats.org/presentationml/2006/main">
-  <p:cSld>
-    <p:spTree>
-      <p:nvGrpSpPr>
-        <p:cNvPr id="1" name=""/>
-        <p:cNvGrpSpPr/>
-        <p:nvPr/>
-      </p:nvGrpSpPr>
-      <p:grpSpPr>
-        <a:xfrm>
-          <a:off x="0" y="0"/>
-          <a:ext cx="0" cy="0"/>
-          <a:chOff x="0" y="0"/>
-          <a:chExt cx="0" cy="0"/>
-        </a:xfrm>
-      </p:grpSpPr>
-      <p:sp>
-        <p:nvSpPr>
-          <p:cNvPr id="2" name="Espaço Reservado para Imagem de Slide 1"/>
-          <p:cNvSpPr>
-            <a:spLocks noGrp="1" noRot="1" noChangeAspect="1"/>
-          </p:cNvSpPr>
-          <p:nvPr>
-            <p:ph type="sldImg"/>
-          </p:nvPr>
-        </p:nvSpPr>
-        <p:spPr/>
-      </p:sp>
-      <p:sp>
-        <p:nvSpPr>
-          <p:cNvPr id="3" name="Espaço Reservado para Anotações 2"/>
-          <p:cNvSpPr>
-            <a:spLocks noGrp="1"/>
-          </p:cNvSpPr>
-          <p:nvPr>
-            <p:ph type="body" idx="1"/>
-          </p:nvPr>
-        </p:nvSpPr>
-        <p:spPr/>
-        <p:txBody>
-          <a:bodyPr/>
-          <a:lstStyle/>
-          <a:p>
-            <a:r>
-              <a:rPr lang="pt-BR" dirty="0"/>
-              <a:t>Na prática</a:t>
-            </a:r>
-          </a:p>
-        </p:txBody>
-      </p:sp>
-      <p:sp>
-        <p:nvSpPr>
-          <p:cNvPr id="4" name="Espaço Reservado para Número de Slide 3"/>
-          <p:cNvSpPr>
-            <a:spLocks noGrp="1"/>
-          </p:cNvSpPr>
-          <p:nvPr>
-            <p:ph type="sldNum" sz="quarter" idx="5"/>
-          </p:nvPr>
-        </p:nvSpPr>
-        <p:spPr/>
-        <p:txBody>
-          <a:bodyPr/>
-          <a:lstStyle/>
-          <a:p>
-            <a:fld id="{04C3BA9C-038C-4BB8-B038-C189F78C736F}" type="slidenum">
-              <a:rPr lang="pt-BR" smtClean="0"/>
-              <a:t>4</a:t>
-            </a:fld>
-            <a:endParaRPr lang="pt-BR"/>
-          </a:p>
-        </p:txBody>
-      </p:sp>
-    </p:spTree>
-    <p:extLst>
-      <p:ext uri="{BB962C8B-B14F-4D97-AF65-F5344CB8AC3E}">
-        <p14:creationId xmlns:p14="http://schemas.microsoft.com/office/powerpoint/2010/main" val="2252283206"/>
-      </p:ext>
-    </p:extLst>
-  </p:cSld>
-  <p:clrMapOvr>
-    <a:masterClrMapping/>
-  </p:clrMapOvr>
-</p:notes>
-</file>
-
-<file path=ppt/notesSlides/notesSlide5.xml><?xml version="1.0" encoding="utf-8"?>
-<p:notes xmlns:a="http://schemas.openxmlformats.org/drawingml/2006/main" xmlns:r="http://schemas.openxmlformats.org/officeDocument/2006/relationships" xmlns:p="http://schemas.openxmlformats.org/presentationml/2006/main">
-  <p:cSld>
-    <p:spTree>
-      <p:nvGrpSpPr>
-        <p:cNvPr id="1" name=""/>
-        <p:cNvGrpSpPr/>
-        <p:nvPr/>
-      </p:nvGrpSpPr>
-      <p:grpSpPr>
-        <a:xfrm>
-          <a:off x="0" y="0"/>
-          <a:ext cx="0" cy="0"/>
-          <a:chOff x="0" y="0"/>
-          <a:chExt cx="0" cy="0"/>
-        </a:xfrm>
-      </p:grpSpPr>
-      <p:sp>
-        <p:nvSpPr>
-          <p:cNvPr id="2" name="Espaço Reservado para Imagem de Slide 1"/>
-          <p:cNvSpPr>
-            <a:spLocks noGrp="1" noRot="1" noChangeAspect="1"/>
-          </p:cNvSpPr>
-          <p:nvPr>
-            <p:ph type="sldImg"/>
-          </p:nvPr>
-        </p:nvSpPr>
-        <p:spPr/>
-      </p:sp>
-      <p:sp>
-        <p:nvSpPr>
-          <p:cNvPr id="3" name="Espaço Reservado para Anotações 2"/>
-          <p:cNvSpPr>
-            <a:spLocks noGrp="1"/>
-          </p:cNvSpPr>
-          <p:nvPr>
-            <p:ph type="body" idx="1"/>
-          </p:nvPr>
-        </p:nvSpPr>
-        <p:spPr/>
-        <p:txBody>
-          <a:bodyPr/>
-          <a:lstStyle/>
-          <a:p>
-            <a:r>
-              <a:rPr lang="pt-BR" dirty="0"/>
-              <a:t>Tentativa como Energia Útil</a:t>
-            </a:r>
-          </a:p>
-        </p:txBody>
-      </p:sp>
-      <p:sp>
-        <p:nvSpPr>
-          <p:cNvPr id="4" name="Espaço Reservado para Número de Slide 3"/>
-          <p:cNvSpPr>
-            <a:spLocks noGrp="1"/>
-          </p:cNvSpPr>
-          <p:nvPr>
-            <p:ph type="sldNum" sz="quarter" idx="5"/>
-          </p:nvPr>
-        </p:nvSpPr>
-        <p:spPr/>
-        <p:txBody>
-          <a:bodyPr/>
-          <a:lstStyle/>
-          <a:p>
-            <a:fld id="{04C3BA9C-038C-4BB8-B038-C189F78C736F}" type="slidenum">
-              <a:rPr lang="pt-BR" smtClean="0"/>
-              <a:t>5</a:t>
-            </a:fld>
-            <a:endParaRPr lang="pt-BR"/>
-          </a:p>
-        </p:txBody>
-      </p:sp>
-    </p:spTree>
-    <p:extLst>
-      <p:ext uri="{BB962C8B-B14F-4D97-AF65-F5344CB8AC3E}">
-        <p14:creationId xmlns:p14="http://schemas.microsoft.com/office/powerpoint/2010/main" val="4234835408"/>
       </p:ext>
     </p:extLst>
   </p:cSld>
@@ -7548,7 +7372,7 @@
                 <a:ea typeface="+mn-ea"/>
                 <a:cs typeface="+mn-cs"/>
               </a:rPr>
-              <a:t>Coal Power plant</a:t>
+              <a:t>Hydro Power plant</a:t>
             </a:r>
             <a:endParaRPr kumimoji="0" lang="en-GB" sz="1400" b="0" i="0" u="none" strike="noStrike" kern="0" cap="none" spc="0" normalizeH="0" baseline="0" noProof="0" dirty="0">
               <a:ln>
@@ -7581,7 +7405,7 @@
         </p:nvSpPr>
         <p:spPr>
           <a:xfrm>
-            <a:off x="2770671" y="3452194"/>
+            <a:off x="2770671" y="3023269"/>
             <a:ext cx="1167812" cy="648098"/>
           </a:xfrm>
           <a:prstGeom prst="roundRect">
@@ -8082,7 +7906,7 @@
                 <a:ea typeface="+mn-ea"/>
                 <a:cs typeface="+mn-cs"/>
               </a:rPr>
-              <a:t>Electric Households</a:t>
+              <a:t>Electric Housing</a:t>
             </a:r>
             <a:endParaRPr kumimoji="0" lang="en-GB" sz="1400" b="0" i="0" u="none" strike="noStrike" kern="0" cap="none" spc="0" normalizeH="0" baseline="0" noProof="0" dirty="0">
               <a:ln>
@@ -8148,8 +7972,8 @@
         </p:nvSpPr>
         <p:spPr>
           <a:xfrm rot="16200000">
-            <a:off x="7908405" y="5380918"/>
-            <a:ext cx="1446028" cy="338554"/>
+            <a:off x="7569355" y="5041867"/>
+            <a:ext cx="2124130" cy="338554"/>
           </a:xfrm>
           <a:prstGeom prst="rect">
             <a:avLst/>
@@ -8191,7 +8015,7 @@
                 <a:uLnTx/>
                 <a:uFillTx/>
               </a:rPr>
-              <a:t>electricity</a:t>
+              <a:t>electric households</a:t>
             </a:r>
             <a:endParaRPr kumimoji="0" lang="en-GB" sz="1600" b="0" i="1" u="none" strike="noStrike" kern="0" cap="none" spc="0" normalizeH="0" baseline="0" noProof="0" dirty="0">
               <a:ln>
@@ -8223,7 +8047,7 @@
         </p:nvCxnSpPr>
         <p:spPr>
           <a:xfrm>
-            <a:off x="3938483" y="3817166"/>
+            <a:off x="3938483" y="3388241"/>
             <a:ext cx="490860" cy="0"/>
           </a:xfrm>
           <a:prstGeom prst="straightConnector1">
@@ -8679,7 +8503,7 @@
                 <a:uLnTx/>
                 <a:uFillTx/>
               </a:rPr>
-              <a:t> Energy (2)</a:t>
+              <a:t> Energy</a:t>
             </a:r>
             <a:endParaRPr kumimoji="0" lang="en-GB" sz="1800" b="0" i="0" u="none" strike="noStrike" kern="0" cap="none" spc="0" normalizeH="0" baseline="0" noProof="0" dirty="0">
               <a:ln>
@@ -8774,7 +8598,7 @@
                 <a:ea typeface="+mn-ea"/>
                 <a:cs typeface="+mn-cs"/>
               </a:rPr>
-              <a:t>Lightning</a:t>
+              <a:t>Bulb</a:t>
             </a:r>
             <a:endParaRPr kumimoji="0" lang="en-GB" sz="1400" b="0" i="0" u="none" strike="noStrike" kern="0" cap="none" spc="0" normalizeH="0" baseline="0" noProof="0" dirty="0">
               <a:ln>
@@ -8840,8 +8664,8 @@
         </p:nvSpPr>
         <p:spPr>
           <a:xfrm rot="16200000">
-            <a:off x="10077433" y="5380918"/>
-            <a:ext cx="1446028" cy="338554"/>
+            <a:off x="9738382" y="5041866"/>
+            <a:ext cx="2124132" cy="338554"/>
           </a:xfrm>
           <a:prstGeom prst="rect">
             <a:avLst/>
@@ -8883,7 +8707,7 @@
                 <a:uLnTx/>
                 <a:uFillTx/>
               </a:rPr>
-              <a:t>light</a:t>
+              <a:t>electric households</a:t>
             </a:r>
             <a:endParaRPr kumimoji="0" lang="en-GB" sz="1600" b="0" i="1" u="none" strike="noStrike" kern="0" cap="none" spc="0" normalizeH="0" baseline="0" noProof="0" dirty="0">
               <a:ln>
@@ -9073,84 +8897,47 @@
           </a:p>
         </p:txBody>
       </p:sp>
-    </p:spTree>
-    <p:extLst>
-      <p:ext uri="{BB962C8B-B14F-4D97-AF65-F5344CB8AC3E}">
-        <p14:creationId xmlns:p14="http://schemas.microsoft.com/office/powerpoint/2010/main" val="3156359377"/>
-      </p:ext>
-    </p:extLst>
-  </p:cSld>
-  <p:clrMapOvr>
-    <a:masterClrMapping/>
-  </p:clrMapOvr>
-</p:sld>
-</file>
-
-<file path=ppt/slides/slide4.xml><?xml version="1.0" encoding="utf-8"?>
-<p:sld xmlns:a="http://schemas.openxmlformats.org/drawingml/2006/main" xmlns:r="http://schemas.openxmlformats.org/officeDocument/2006/relationships" xmlns:p="http://schemas.openxmlformats.org/presentationml/2006/main">
-  <p:cSld>
-    <p:spTree>
-      <p:nvGrpSpPr>
-        <p:cNvPr id="1" name="">
-          <a:extLst>
-            <a:ext uri="{FF2B5EF4-FFF2-40B4-BE49-F238E27FC236}">
-              <a16:creationId xmlns:a16="http://schemas.microsoft.com/office/drawing/2014/main" id="{97999C87-6155-B2AB-7692-CC5100E79943}"/>
-            </a:ext>
-          </a:extLst>
-        </p:cNvPr>
-        <p:cNvGrpSpPr/>
-        <p:nvPr/>
-      </p:nvGrpSpPr>
-      <p:grpSpPr>
-        <a:xfrm>
-          <a:off x="0" y="0"/>
-          <a:ext cx="0" cy="0"/>
-          <a:chOff x="0" y="0"/>
-          <a:chExt cx="0" cy="0"/>
-        </a:xfrm>
-      </p:grpSpPr>
-      <p:pic>
-        <p:nvPicPr>
-          <p:cNvPr id="82" name="Picture 4" descr="A picture containing tree&#10;&#10;Description automatically generated">
+      <p:sp>
+        <p:nvSpPr>
+          <p:cNvPr id="2" name="CaixaDeTexto 1">
             <a:extLst>
               <a:ext uri="{FF2B5EF4-FFF2-40B4-BE49-F238E27FC236}">
-                <a16:creationId xmlns:a16="http://schemas.microsoft.com/office/drawing/2014/main" id="{5C78F37C-5E16-9B7C-66A5-C574BCF33650}"/>
+                <a16:creationId xmlns:a16="http://schemas.microsoft.com/office/drawing/2014/main" id="{7139667C-6E5D-7404-EBA7-FA3B3B14E659}"/>
               </a:ext>
             </a:extLst>
           </p:cNvPr>
-          <p:cNvPicPr>
-            <a:picLocks noChangeAspect="1"/>
-          </p:cNvPicPr>
-          <p:nvPr/>
-        </p:nvPicPr>
-        <p:blipFill>
-          <a:blip r:embed="rId3">
-            <a:extLst>
-              <a:ext uri="{28A0092B-C50C-407E-A947-70E740481C1C}">
-                <a14:useLocalDpi xmlns:a14="http://schemas.microsoft.com/office/drawing/2010/main" val="0"/>
-              </a:ext>
-            </a:extLst>
-          </a:blip>
-          <a:stretch>
-            <a:fillRect/>
-          </a:stretch>
-        </p:blipFill>
+          <p:cNvSpPr txBox="1"/>
+          <p:nvPr/>
+        </p:nvSpPr>
         <p:spPr>
-          <a:xfrm>
-            <a:off x="80282" y="90975"/>
-            <a:ext cx="1748518" cy="6650067"/>
+          <a:xfrm rot="5400000">
+            <a:off x="3226163" y="3737577"/>
+            <a:ext cx="458780" cy="523220"/>
           </a:xfrm>
           <a:prstGeom prst="rect">
             <a:avLst/>
           </a:prstGeom>
-        </p:spPr>
-      </p:pic>
-      <p:sp>
-        <p:nvSpPr>
-          <p:cNvPr id="83" name="Rectangle: Rounded Corners 5">
+          <a:noFill/>
+        </p:spPr>
+        <p:txBody>
+          <a:bodyPr wrap="none" rtlCol="0">
+            <a:spAutoFit/>
+          </a:bodyPr>
+          <a:lstStyle/>
+          <a:p>
+            <a:r>
+              <a:rPr lang="pt-BR" sz="2800" dirty="0"/>
+              <a:t>...</a:t>
+            </a:r>
+          </a:p>
+        </p:txBody>
+      </p:sp>
+      <p:sp>
+        <p:nvSpPr>
+          <p:cNvPr id="3" name="Rectangle: Rounded Corners 5">
             <a:extLst>
               <a:ext uri="{FF2B5EF4-FFF2-40B4-BE49-F238E27FC236}">
-                <a16:creationId xmlns:a16="http://schemas.microsoft.com/office/drawing/2014/main" id="{99D32BEB-D502-1903-D49A-770A13C0D3E0}"/>
+                <a16:creationId xmlns:a16="http://schemas.microsoft.com/office/drawing/2014/main" id="{1E41E1DC-A110-7665-7B86-4C273A72FB20}"/>
               </a:ext>
             </a:extLst>
           </p:cNvPr>
@@ -9159,7 +8946,7 @@
         </p:nvSpPr>
         <p:spPr>
           <a:xfrm>
-            <a:off x="2770671" y="2158409"/>
+            <a:off x="2756722" y="4318028"/>
             <a:ext cx="1167812" cy="648098"/>
           </a:xfrm>
           <a:prstGeom prst="roundRect">
@@ -9221,7 +9008,7 @@
                 <a:ea typeface="+mn-ea"/>
                 <a:cs typeface="+mn-cs"/>
               </a:rPr>
-              <a:t>Coal Power plant</a:t>
+              <a:t>Oil Power plant</a:t>
             </a:r>
             <a:endParaRPr kumimoji="0" lang="en-GB" sz="1400" b="0" i="0" u="none" strike="noStrike" kern="0" cap="none" spc="0" normalizeH="0" baseline="0" noProof="0" dirty="0">
               <a:ln>
@@ -9240,107 +9027,12 @@
           </a:p>
         </p:txBody>
       </p:sp>
-      <p:sp>
-        <p:nvSpPr>
-          <p:cNvPr id="84" name="Rectangle: Rounded Corners 7">
+      <p:cxnSp>
+        <p:nvCxnSpPr>
+          <p:cNvPr id="4" name="Straight Arrow Connector 18">
             <a:extLst>
               <a:ext uri="{FF2B5EF4-FFF2-40B4-BE49-F238E27FC236}">
-                <a16:creationId xmlns:a16="http://schemas.microsoft.com/office/drawing/2014/main" id="{26AA3ED7-3B37-31AD-A6B6-AA9331D5D492}"/>
-              </a:ext>
-            </a:extLst>
-          </p:cNvPr>
-          <p:cNvSpPr/>
-          <p:nvPr/>
-        </p:nvSpPr>
-        <p:spPr>
-          <a:xfrm>
-            <a:off x="2770671" y="3452194"/>
-            <a:ext cx="1167812" cy="648098"/>
-          </a:xfrm>
-          <a:prstGeom prst="roundRect">
-            <a:avLst/>
-          </a:prstGeom>
-          <a:solidFill>
-            <a:srgbClr val="4472C4"/>
-          </a:solidFill>
-          <a:ln w="12700" cap="flat" cmpd="sng" algn="ctr">
-            <a:solidFill>
-              <a:srgbClr val="4472C4">
-                <a:shade val="50000"/>
-              </a:srgbClr>
-            </a:solidFill>
-            <a:prstDash val="solid"/>
-            <a:miter lim="800000"/>
-          </a:ln>
-          <a:effectLst>
-            <a:outerShdw blurRad="50800" dist="38100" dir="2700000" algn="tl" rotWithShape="0">
-              <a:prstClr val="black">
-                <a:alpha val="40000"/>
-              </a:prstClr>
-            </a:outerShdw>
-          </a:effectLst>
-        </p:spPr>
-        <p:txBody>
-          <a:bodyPr rtlCol="0" anchor="ctr"/>
-          <a:lstStyle/>
-          <a:p>
-            <a:pPr marL="0" marR="0" lvl="0" indent="0" algn="ctr" defTabSz="914400" eaLnBrk="1" fontAlgn="auto" latinLnBrk="0" hangingPunct="1">
-              <a:lnSpc>
-                <a:spcPct val="100000"/>
-              </a:lnSpc>
-              <a:spcBef>
-                <a:spcPts val="0"/>
-              </a:spcBef>
-              <a:spcAft>
-                <a:spcPts val="0"/>
-              </a:spcAft>
-              <a:buClrTx/>
-              <a:buSzTx/>
-              <a:buFontTx/>
-              <a:buNone/>
-              <a:tabLst/>
-              <a:defRPr/>
-            </a:pPr>
-            <a:r>
-              <a:rPr kumimoji="0" lang="en-US" sz="1400" b="0" i="0" u="none" strike="noStrike" kern="0" cap="none" spc="0" normalizeH="0" baseline="0" noProof="0" dirty="0">
-                <a:ln>
-                  <a:noFill/>
-                </a:ln>
-                <a:solidFill>
-                  <a:prstClr val="white"/>
-                </a:solidFill>
-                <a:effectLst/>
-                <a:uLnTx/>
-                <a:uFillTx/>
-                <a:latin typeface="Calibri" panose="020F0502020204030204"/>
-                <a:ea typeface="+mn-ea"/>
-                <a:cs typeface="+mn-cs"/>
-              </a:rPr>
-              <a:t>Wind Power plant</a:t>
-            </a:r>
-            <a:endParaRPr kumimoji="0" lang="en-GB" sz="1400" b="0" i="0" u="none" strike="noStrike" kern="0" cap="none" spc="0" normalizeH="0" baseline="0" noProof="0" dirty="0">
-              <a:ln>
-                <a:noFill/>
-              </a:ln>
-              <a:solidFill>
-                <a:prstClr val="white"/>
-              </a:solidFill>
-              <a:effectLst/>
-              <a:uLnTx/>
-              <a:uFillTx/>
-              <a:latin typeface="Calibri" panose="020F0502020204030204"/>
-              <a:ea typeface="+mn-ea"/>
-              <a:cs typeface="+mn-cs"/>
-            </a:endParaRPr>
-          </a:p>
-        </p:txBody>
-      </p:sp>
-      <p:cxnSp>
-        <p:nvCxnSpPr>
-          <p:cNvPr id="85" name="Straight Connector 9">
-            <a:extLst>
-              <a:ext uri="{FF2B5EF4-FFF2-40B4-BE49-F238E27FC236}">
-                <a16:creationId xmlns:a16="http://schemas.microsoft.com/office/drawing/2014/main" id="{AF0B7204-14F6-1167-6373-490D907623CF}"/>
+                <a16:creationId xmlns:a16="http://schemas.microsoft.com/office/drawing/2014/main" id="{0E0F6F7E-1541-98D1-D121-CAF7BDDD19D1}"/>
               </a:ext>
             </a:extLst>
           </p:cNvPr>
@@ -9351,113 +9043,7 @@
         </p:nvCxnSpPr>
         <p:spPr>
           <a:xfrm>
-            <a:off x="4427572" y="1424763"/>
-            <a:ext cx="0" cy="4848446"/>
-          </a:xfrm>
-          <a:prstGeom prst="line">
-            <a:avLst/>
-          </a:prstGeom>
-          <a:noFill/>
-          <a:ln w="19050" cap="flat" cmpd="sng" algn="ctr">
-            <a:solidFill>
-              <a:srgbClr val="A5A5A5"/>
-            </a:solidFill>
-            <a:prstDash val="solid"/>
-            <a:miter lim="800000"/>
-          </a:ln>
-          <a:effectLst/>
-        </p:spPr>
-      </p:cxnSp>
-      <p:sp>
-        <p:nvSpPr>
-          <p:cNvPr id="86" name="TextBox 11">
-            <a:extLst>
-              <a:ext uri="{FF2B5EF4-FFF2-40B4-BE49-F238E27FC236}">
-                <a16:creationId xmlns:a16="http://schemas.microsoft.com/office/drawing/2014/main" id="{9EBF433D-F633-F69D-ACCD-03FA0293DCC5}"/>
-              </a:ext>
-            </a:extLst>
-          </p:cNvPr>
-          <p:cNvSpPr txBox="1"/>
-          <p:nvPr/>
-        </p:nvSpPr>
-        <p:spPr>
-          <a:xfrm rot="16200000">
-            <a:off x="3598236" y="5380918"/>
-            <a:ext cx="1446028" cy="338554"/>
-          </a:xfrm>
-          <a:prstGeom prst="rect">
-            <a:avLst/>
-          </a:prstGeom>
-          <a:noFill/>
-        </p:spPr>
-        <p:txBody>
-          <a:bodyPr wrap="square" rtlCol="0">
-            <a:spAutoFit/>
-          </a:bodyPr>
-          <a:lstStyle/>
-          <a:p>
-            <a:pPr marL="0" marR="0" lvl="0" indent="0" defTabSz="914400" eaLnBrk="1" fontAlgn="auto" latinLnBrk="0" hangingPunct="1">
-              <a:lnSpc>
-                <a:spcPct val="100000"/>
-              </a:lnSpc>
-              <a:spcBef>
-                <a:spcPts val="0"/>
-              </a:spcBef>
-              <a:spcAft>
-                <a:spcPts val="0"/>
-              </a:spcAft>
-              <a:buClrTx/>
-              <a:buSzTx/>
-              <a:buFontTx/>
-              <a:buNone/>
-              <a:tabLst/>
-              <a:defRPr/>
-            </a:pPr>
-            <a:r>
-              <a:rPr kumimoji="0" lang="en-US" sz="1600" b="0" i="1" u="none" strike="noStrike" kern="0" cap="none" spc="0" normalizeH="0" baseline="0" noProof="0" dirty="0">
-                <a:ln>
-                  <a:noFill/>
-                </a:ln>
-                <a:solidFill>
-                  <a:prstClr val="black"/>
-                </a:solidFill>
-                <a:effectLst/>
-                <a:uLnTx/>
-                <a:uFillTx/>
-              </a:rPr>
-              <a:t>electricity</a:t>
-            </a:r>
-            <a:endParaRPr kumimoji="0" lang="en-GB" sz="1600" b="0" i="1" u="none" strike="noStrike" kern="0" cap="none" spc="0" normalizeH="0" baseline="0" noProof="0" dirty="0">
-              <a:ln>
-                <a:noFill/>
-              </a:ln>
-              <a:solidFill>
-                <a:prstClr val="black"/>
-              </a:solidFill>
-              <a:effectLst/>
-              <a:uLnTx/>
-              <a:uFillTx/>
-            </a:endParaRPr>
-          </a:p>
-        </p:txBody>
-      </p:sp>
-      <p:cxnSp>
-        <p:nvCxnSpPr>
-          <p:cNvPr id="87" name="Straight Arrow Connector 18">
-            <a:extLst>
-              <a:ext uri="{FF2B5EF4-FFF2-40B4-BE49-F238E27FC236}">
-                <a16:creationId xmlns:a16="http://schemas.microsoft.com/office/drawing/2014/main" id="{EF27C09B-C37C-8AB8-FCDF-E872EF4F79EC}"/>
-              </a:ext>
-            </a:extLst>
-          </p:cNvPr>
-          <p:cNvCxnSpPr>
-            <a:cxnSpLocks/>
-          </p:cNvCxnSpPr>
-          <p:nvPr/>
-        </p:nvCxnSpPr>
-        <p:spPr>
-          <a:xfrm>
-            <a:off x="3949116" y="2463287"/>
+            <a:off x="3935167" y="4622906"/>
             <a:ext cx="490860" cy="0"/>
           </a:xfrm>
           <a:prstGeom prst="straightConnector1">
@@ -9475,2742 +9061,10 @@
           <a:effectLst/>
         </p:spPr>
       </p:cxnSp>
-      <p:sp>
-        <p:nvSpPr>
-          <p:cNvPr id="88" name="Rectangle: Rounded Corners 20">
-            <a:extLst>
-              <a:ext uri="{FF2B5EF4-FFF2-40B4-BE49-F238E27FC236}">
-                <a16:creationId xmlns:a16="http://schemas.microsoft.com/office/drawing/2014/main" id="{BB9437DA-39B1-D4CF-01F6-41479B87399E}"/>
-              </a:ext>
-            </a:extLst>
-          </p:cNvPr>
-          <p:cNvSpPr/>
-          <p:nvPr/>
-        </p:nvSpPr>
-        <p:spPr>
-          <a:xfrm>
-            <a:off x="4928188" y="2701159"/>
-            <a:ext cx="1167812" cy="648098"/>
-          </a:xfrm>
-          <a:prstGeom prst="roundRect">
-            <a:avLst/>
-          </a:prstGeom>
-          <a:solidFill>
-            <a:srgbClr val="A5A5A5"/>
-          </a:solidFill>
-          <a:ln w="12700" cap="flat" cmpd="sng" algn="ctr">
-            <a:solidFill>
-              <a:srgbClr val="4472C4">
-                <a:shade val="50000"/>
-              </a:srgbClr>
-            </a:solidFill>
-            <a:prstDash val="solid"/>
-            <a:miter lim="800000"/>
-          </a:ln>
-          <a:effectLst>
-            <a:outerShdw blurRad="50800" dist="38100" dir="2700000" algn="tl" rotWithShape="0">
-              <a:prstClr val="black">
-                <a:alpha val="40000"/>
-              </a:prstClr>
-            </a:outerShdw>
-          </a:effectLst>
-        </p:spPr>
-        <p:txBody>
-          <a:bodyPr rtlCol="0" anchor="ctr"/>
-          <a:lstStyle/>
-          <a:p>
-            <a:pPr marL="0" marR="0" lvl="0" indent="0" algn="ctr" defTabSz="914400" eaLnBrk="1" fontAlgn="auto" latinLnBrk="0" hangingPunct="1">
-              <a:lnSpc>
-                <a:spcPct val="100000"/>
-              </a:lnSpc>
-              <a:spcBef>
-                <a:spcPts val="0"/>
-              </a:spcBef>
-              <a:spcAft>
-                <a:spcPts val="0"/>
-              </a:spcAft>
-              <a:buClrTx/>
-              <a:buSzTx/>
-              <a:buFontTx/>
-              <a:buNone/>
-              <a:tabLst/>
-              <a:defRPr/>
-            </a:pPr>
-            <a:r>
-              <a:rPr kumimoji="0" lang="en-US" sz="1400" b="0" i="0" u="none" strike="noStrike" kern="0" cap="none" spc="0" normalizeH="0" baseline="0" noProof="0" dirty="0">
-                <a:ln>
-                  <a:noFill/>
-                </a:ln>
-                <a:solidFill>
-                  <a:prstClr val="white"/>
-                </a:solidFill>
-                <a:effectLst/>
-                <a:uLnTx/>
-                <a:uFillTx/>
-                <a:latin typeface="Calibri" panose="020F0502020204030204"/>
-                <a:ea typeface="+mn-ea"/>
-                <a:cs typeface="+mn-cs"/>
-              </a:rPr>
-              <a:t>Electricity grid</a:t>
-            </a:r>
-            <a:endParaRPr kumimoji="0" lang="en-GB" sz="1400" b="0" i="0" u="none" strike="noStrike" kern="0" cap="none" spc="0" normalizeH="0" baseline="0" noProof="0" dirty="0">
-              <a:ln>
-                <a:noFill/>
-              </a:ln>
-              <a:solidFill>
-                <a:prstClr val="white"/>
-              </a:solidFill>
-              <a:effectLst/>
-              <a:uLnTx/>
-              <a:uFillTx/>
-              <a:latin typeface="Calibri" panose="020F0502020204030204"/>
-              <a:ea typeface="+mn-ea"/>
-              <a:cs typeface="+mn-cs"/>
-            </a:endParaRPr>
-          </a:p>
-        </p:txBody>
-      </p:sp>
-      <p:cxnSp>
-        <p:nvCxnSpPr>
-          <p:cNvPr id="89" name="Straight Connector 23">
-            <a:extLst>
-              <a:ext uri="{FF2B5EF4-FFF2-40B4-BE49-F238E27FC236}">
-                <a16:creationId xmlns:a16="http://schemas.microsoft.com/office/drawing/2014/main" id="{4DE0ED22-E571-E067-A57E-A44ABF6055E6}"/>
-              </a:ext>
-            </a:extLst>
-          </p:cNvPr>
-          <p:cNvCxnSpPr>
-            <a:cxnSpLocks/>
-          </p:cNvCxnSpPr>
-          <p:nvPr/>
-        </p:nvCxnSpPr>
-        <p:spPr>
-          <a:xfrm>
-            <a:off x="6574470" y="1414130"/>
-            <a:ext cx="0" cy="4848446"/>
-          </a:xfrm>
-          <a:prstGeom prst="line">
-            <a:avLst/>
-          </a:prstGeom>
-          <a:noFill/>
-          <a:ln w="19050" cap="flat" cmpd="sng" algn="ctr">
-            <a:solidFill>
-              <a:srgbClr val="A5A5A5"/>
-            </a:solidFill>
-            <a:prstDash val="solid"/>
-            <a:miter lim="800000"/>
-          </a:ln>
-          <a:effectLst/>
-        </p:spPr>
-      </p:cxnSp>
-      <p:sp>
-        <p:nvSpPr>
-          <p:cNvPr id="90" name="TextBox 24">
-            <a:extLst>
-              <a:ext uri="{FF2B5EF4-FFF2-40B4-BE49-F238E27FC236}">
-                <a16:creationId xmlns:a16="http://schemas.microsoft.com/office/drawing/2014/main" id="{C7ABCCD8-F00B-78D5-B30E-17B929A07E7C}"/>
-              </a:ext>
-            </a:extLst>
-          </p:cNvPr>
-          <p:cNvSpPr txBox="1"/>
-          <p:nvPr/>
-        </p:nvSpPr>
-        <p:spPr>
-          <a:xfrm rot="16200000">
-            <a:off x="5745134" y="5370285"/>
-            <a:ext cx="1446028" cy="338554"/>
-          </a:xfrm>
-          <a:prstGeom prst="rect">
-            <a:avLst/>
-          </a:prstGeom>
-          <a:noFill/>
-        </p:spPr>
-        <p:txBody>
-          <a:bodyPr wrap="square" rtlCol="0">
-            <a:spAutoFit/>
-          </a:bodyPr>
-          <a:lstStyle/>
-          <a:p>
-            <a:pPr marL="0" marR="0" lvl="0" indent="0" defTabSz="914400" eaLnBrk="1" fontAlgn="auto" latinLnBrk="0" hangingPunct="1">
-              <a:lnSpc>
-                <a:spcPct val="100000"/>
-              </a:lnSpc>
-              <a:spcBef>
-                <a:spcPts val="0"/>
-              </a:spcBef>
-              <a:spcAft>
-                <a:spcPts val="0"/>
-              </a:spcAft>
-              <a:buClrTx/>
-              <a:buSzTx/>
-              <a:buFontTx/>
-              <a:buNone/>
-              <a:tabLst/>
-              <a:defRPr/>
-            </a:pPr>
-            <a:r>
-              <a:rPr kumimoji="0" lang="en-US" sz="1600" b="0" i="1" u="none" strike="noStrike" kern="0" cap="none" spc="0" normalizeH="0" baseline="0" noProof="0" dirty="0">
-                <a:ln>
-                  <a:noFill/>
-                </a:ln>
-                <a:solidFill>
-                  <a:prstClr val="black"/>
-                </a:solidFill>
-                <a:effectLst/>
-                <a:uLnTx/>
-                <a:uFillTx/>
-              </a:rPr>
-              <a:t>electricity</a:t>
-            </a:r>
-            <a:endParaRPr kumimoji="0" lang="en-GB" sz="1600" b="0" i="1" u="none" strike="noStrike" kern="0" cap="none" spc="0" normalizeH="0" baseline="0" noProof="0" dirty="0">
-              <a:ln>
-                <a:noFill/>
-              </a:ln>
-              <a:solidFill>
-                <a:prstClr val="black"/>
-              </a:solidFill>
-              <a:effectLst/>
-              <a:uLnTx/>
-              <a:uFillTx/>
-            </a:endParaRPr>
-          </a:p>
-        </p:txBody>
-      </p:sp>
-      <p:sp>
-        <p:nvSpPr>
-          <p:cNvPr id="91" name="Rectangle: Rounded Corners 26">
-            <a:extLst>
-              <a:ext uri="{FF2B5EF4-FFF2-40B4-BE49-F238E27FC236}">
-                <a16:creationId xmlns:a16="http://schemas.microsoft.com/office/drawing/2014/main" id="{115061CC-9197-6B74-8D0B-AC71CF0AA8CA}"/>
-              </a:ext>
-            </a:extLst>
-          </p:cNvPr>
-          <p:cNvSpPr/>
-          <p:nvPr/>
-        </p:nvSpPr>
-        <p:spPr>
-          <a:xfrm>
-            <a:off x="7079476" y="1359363"/>
-            <a:ext cx="1167812" cy="648098"/>
-          </a:xfrm>
-          <a:prstGeom prst="roundRect">
-            <a:avLst/>
-          </a:prstGeom>
-          <a:solidFill>
-            <a:srgbClr val="FFC000">
-              <a:lumMod val="60000"/>
-              <a:lumOff val="40000"/>
-            </a:srgbClr>
-          </a:solidFill>
-          <a:ln w="12700" cap="flat" cmpd="sng" algn="ctr">
-            <a:solidFill>
-              <a:srgbClr val="4472C4">
-                <a:shade val="50000"/>
-              </a:srgbClr>
-            </a:solidFill>
-            <a:prstDash val="solid"/>
-            <a:miter lim="800000"/>
-          </a:ln>
-          <a:effectLst>
-            <a:outerShdw blurRad="50800" dist="38100" dir="2700000" algn="tl" rotWithShape="0">
-              <a:prstClr val="black">
-                <a:alpha val="40000"/>
-              </a:prstClr>
-            </a:outerShdw>
-          </a:effectLst>
-        </p:spPr>
-        <p:txBody>
-          <a:bodyPr rtlCol="0" anchor="ctr"/>
-          <a:lstStyle/>
-          <a:p>
-            <a:pPr marL="0" marR="0" lvl="0" indent="0" algn="ctr" defTabSz="914400" eaLnBrk="1" fontAlgn="auto" latinLnBrk="0" hangingPunct="1">
-              <a:lnSpc>
-                <a:spcPct val="100000"/>
-              </a:lnSpc>
-              <a:spcBef>
-                <a:spcPts val="0"/>
-              </a:spcBef>
-              <a:spcAft>
-                <a:spcPts val="0"/>
-              </a:spcAft>
-              <a:buClrTx/>
-              <a:buSzTx/>
-              <a:buFontTx/>
-              <a:buNone/>
-              <a:tabLst/>
-              <a:defRPr/>
-            </a:pPr>
-            <a:r>
-              <a:rPr kumimoji="0" lang="en-US" sz="1400" b="0" i="0" u="none" strike="noStrike" kern="0" cap="none" spc="0" normalizeH="0" baseline="0" noProof="0" dirty="0">
-                <a:ln>
-                  <a:noFill/>
-                </a:ln>
-                <a:solidFill>
-                  <a:srgbClr val="44546A"/>
-                </a:solidFill>
-                <a:effectLst/>
-                <a:uLnTx/>
-                <a:uFillTx/>
-                <a:latin typeface="Calibri" panose="020F0502020204030204"/>
-                <a:ea typeface="+mn-ea"/>
-                <a:cs typeface="+mn-cs"/>
-              </a:rPr>
-              <a:t>Electric Households</a:t>
-            </a:r>
-            <a:endParaRPr kumimoji="0" lang="en-GB" sz="1400" b="0" i="0" u="none" strike="noStrike" kern="0" cap="none" spc="0" normalizeH="0" baseline="0" noProof="0" dirty="0">
-              <a:ln>
-                <a:noFill/>
-              </a:ln>
-              <a:solidFill>
-                <a:srgbClr val="44546A"/>
-              </a:solidFill>
-              <a:effectLst/>
-              <a:uLnTx/>
-              <a:uFillTx/>
-              <a:latin typeface="Calibri" panose="020F0502020204030204"/>
-              <a:ea typeface="+mn-ea"/>
-              <a:cs typeface="+mn-cs"/>
-            </a:endParaRPr>
-          </a:p>
-        </p:txBody>
-      </p:sp>
-      <p:cxnSp>
-        <p:nvCxnSpPr>
-          <p:cNvPr id="94" name="Straight Arrow Connector 35">
-            <a:extLst>
-              <a:ext uri="{FF2B5EF4-FFF2-40B4-BE49-F238E27FC236}">
-                <a16:creationId xmlns:a16="http://schemas.microsoft.com/office/drawing/2014/main" id="{914ED883-9575-87DF-C546-71C235DBF9CC}"/>
-              </a:ext>
-            </a:extLst>
-          </p:cNvPr>
-          <p:cNvCxnSpPr>
-            <a:cxnSpLocks/>
-          </p:cNvCxnSpPr>
-          <p:nvPr/>
-        </p:nvCxnSpPr>
-        <p:spPr>
-          <a:xfrm>
-            <a:off x="3938483" y="3817166"/>
-            <a:ext cx="490860" cy="0"/>
-          </a:xfrm>
-          <a:prstGeom prst="straightConnector1">
-            <a:avLst/>
-          </a:prstGeom>
-          <a:noFill/>
-          <a:ln w="19050" cap="flat" cmpd="sng" algn="ctr">
-            <a:solidFill>
-              <a:srgbClr val="A5A5A5"/>
-            </a:solidFill>
-            <a:prstDash val="solid"/>
-            <a:miter lim="800000"/>
-            <a:tailEnd type="triangle"/>
-          </a:ln>
-          <a:effectLst/>
-        </p:spPr>
-      </p:cxnSp>
-      <p:cxnSp>
-        <p:nvCxnSpPr>
-          <p:cNvPr id="95" name="Straight Arrow Connector 36">
-            <a:extLst>
-              <a:ext uri="{FF2B5EF4-FFF2-40B4-BE49-F238E27FC236}">
-                <a16:creationId xmlns:a16="http://schemas.microsoft.com/office/drawing/2014/main" id="{18B892A0-B962-F9BD-5AC1-4F1D5712A24A}"/>
-              </a:ext>
-            </a:extLst>
-          </p:cNvPr>
-          <p:cNvCxnSpPr>
-            <a:cxnSpLocks/>
-          </p:cNvCxnSpPr>
-          <p:nvPr/>
-        </p:nvCxnSpPr>
-        <p:spPr>
-          <a:xfrm>
-            <a:off x="4439976" y="3023269"/>
-            <a:ext cx="490860" cy="0"/>
-          </a:xfrm>
-          <a:prstGeom prst="straightConnector1">
-            <a:avLst/>
-          </a:prstGeom>
-          <a:noFill/>
-          <a:ln w="19050" cap="flat" cmpd="sng" algn="ctr">
-            <a:solidFill>
-              <a:srgbClr val="A5A5A5"/>
-            </a:solidFill>
-            <a:prstDash val="solid"/>
-            <a:miter lim="800000"/>
-            <a:tailEnd type="triangle"/>
-          </a:ln>
-          <a:effectLst/>
-        </p:spPr>
-      </p:cxnSp>
-      <p:cxnSp>
-        <p:nvCxnSpPr>
-          <p:cNvPr id="96" name="Straight Arrow Connector 37">
-            <a:extLst>
-              <a:ext uri="{FF2B5EF4-FFF2-40B4-BE49-F238E27FC236}">
-                <a16:creationId xmlns:a16="http://schemas.microsoft.com/office/drawing/2014/main" id="{6606A24C-D19B-D906-ACE5-1E2694DEEA7A}"/>
-              </a:ext>
-            </a:extLst>
-          </p:cNvPr>
-          <p:cNvCxnSpPr>
-            <a:cxnSpLocks/>
-          </p:cNvCxnSpPr>
-          <p:nvPr/>
-        </p:nvCxnSpPr>
-        <p:spPr>
-          <a:xfrm>
-            <a:off x="6096000" y="3023269"/>
-            <a:ext cx="490860" cy="0"/>
-          </a:xfrm>
-          <a:prstGeom prst="straightConnector1">
-            <a:avLst/>
-          </a:prstGeom>
-          <a:noFill/>
-          <a:ln w="19050" cap="flat" cmpd="sng" algn="ctr">
-            <a:solidFill>
-              <a:srgbClr val="A5A5A5"/>
-            </a:solidFill>
-            <a:prstDash val="solid"/>
-            <a:miter lim="800000"/>
-            <a:tailEnd type="triangle"/>
-          </a:ln>
-          <a:effectLst/>
-        </p:spPr>
-      </p:cxnSp>
-      <p:cxnSp>
-        <p:nvCxnSpPr>
-          <p:cNvPr id="97" name="Straight Arrow Connector 38">
-            <a:extLst>
-              <a:ext uri="{FF2B5EF4-FFF2-40B4-BE49-F238E27FC236}">
-                <a16:creationId xmlns:a16="http://schemas.microsoft.com/office/drawing/2014/main" id="{0DB85C5C-0756-7D9D-4B22-CA89CF6F3738}"/>
-              </a:ext>
-            </a:extLst>
-          </p:cNvPr>
-          <p:cNvCxnSpPr>
-            <a:cxnSpLocks/>
-          </p:cNvCxnSpPr>
-          <p:nvPr/>
-        </p:nvCxnSpPr>
-        <p:spPr>
-          <a:xfrm>
-            <a:off x="6586860" y="1683412"/>
-            <a:ext cx="490860" cy="0"/>
-          </a:xfrm>
-          <a:prstGeom prst="straightConnector1">
-            <a:avLst/>
-          </a:prstGeom>
-          <a:noFill/>
-          <a:ln w="19050" cap="flat" cmpd="sng" algn="ctr">
-            <a:solidFill>
-              <a:srgbClr val="A5A5A5"/>
-            </a:solidFill>
-            <a:prstDash val="solid"/>
-            <a:miter lim="800000"/>
-            <a:tailEnd type="triangle"/>
-          </a:ln>
-          <a:effectLst/>
-        </p:spPr>
-      </p:cxnSp>
-      <p:sp>
-        <p:nvSpPr>
-          <p:cNvPr id="99" name="TextBox 27">
-            <a:extLst>
-              <a:ext uri="{FF2B5EF4-FFF2-40B4-BE49-F238E27FC236}">
-                <a16:creationId xmlns:a16="http://schemas.microsoft.com/office/drawing/2014/main" id="{D604A8D2-8B20-6A47-0E9E-65120212EC2D}"/>
-              </a:ext>
-            </a:extLst>
-          </p:cNvPr>
-          <p:cNvSpPr txBox="1"/>
-          <p:nvPr/>
-        </p:nvSpPr>
-        <p:spPr>
-          <a:xfrm>
-            <a:off x="3271267" y="89549"/>
-            <a:ext cx="2052083" cy="646331"/>
-          </a:xfrm>
-          <a:prstGeom prst="rect">
-            <a:avLst/>
-          </a:prstGeom>
-          <a:noFill/>
-        </p:spPr>
-        <p:txBody>
-          <a:bodyPr wrap="square" rtlCol="0">
-            <a:spAutoFit/>
-          </a:bodyPr>
-          <a:lstStyle/>
-          <a:p>
-            <a:pPr marL="0" marR="0" lvl="0" indent="0" algn="ctr" defTabSz="914400" eaLnBrk="1" fontAlgn="auto" latinLnBrk="0" hangingPunct="1">
-              <a:lnSpc>
-                <a:spcPct val="100000"/>
-              </a:lnSpc>
-              <a:spcBef>
-                <a:spcPts val="0"/>
-              </a:spcBef>
-              <a:spcAft>
-                <a:spcPts val="0"/>
-              </a:spcAft>
-              <a:buClrTx/>
-              <a:buSzTx/>
-              <a:buFontTx/>
-              <a:buNone/>
-              <a:tabLst/>
-              <a:defRPr/>
-            </a:pPr>
-            <a:r>
-              <a:rPr kumimoji="0" lang="en-US" sz="1800" b="0" i="0" u="none" strike="noStrike" kern="0" cap="none" spc="0" normalizeH="0" baseline="0" noProof="0" dirty="0">
-                <a:ln>
-                  <a:noFill/>
-                </a:ln>
-                <a:solidFill>
-                  <a:prstClr val="black"/>
-                </a:solidFill>
-                <a:effectLst/>
-                <a:uLnTx/>
-                <a:uFillTx/>
-              </a:rPr>
-              <a:t>Secondary</a:t>
-            </a:r>
-          </a:p>
-          <a:p>
-            <a:pPr marL="0" marR="0" lvl="0" indent="0" algn="ctr" defTabSz="914400" eaLnBrk="1" fontAlgn="auto" latinLnBrk="0" hangingPunct="1">
-              <a:lnSpc>
-                <a:spcPct val="100000"/>
-              </a:lnSpc>
-              <a:spcBef>
-                <a:spcPts val="0"/>
-              </a:spcBef>
-              <a:spcAft>
-                <a:spcPts val="0"/>
-              </a:spcAft>
-              <a:buClrTx/>
-              <a:buSzTx/>
-              <a:buFontTx/>
-              <a:buNone/>
-              <a:tabLst/>
-              <a:defRPr/>
-            </a:pPr>
-            <a:r>
-              <a:rPr kumimoji="0" lang="en-US" sz="1800" b="0" i="0" u="none" strike="noStrike" kern="0" cap="none" spc="0" normalizeH="0" baseline="0" noProof="0" dirty="0">
-                <a:ln>
-                  <a:noFill/>
-                </a:ln>
-                <a:solidFill>
-                  <a:prstClr val="black"/>
-                </a:solidFill>
-                <a:effectLst/>
-                <a:uLnTx/>
-                <a:uFillTx/>
-              </a:rPr>
-              <a:t> Energy</a:t>
-            </a:r>
-            <a:endParaRPr kumimoji="0" lang="en-GB" sz="1800" b="0" i="0" u="none" strike="noStrike" kern="0" cap="none" spc="0" normalizeH="0" baseline="0" noProof="0" dirty="0">
-              <a:ln>
-                <a:noFill/>
-              </a:ln>
-              <a:solidFill>
-                <a:prstClr val="black"/>
-              </a:solidFill>
-              <a:effectLst/>
-              <a:uLnTx/>
-              <a:uFillTx/>
-            </a:endParaRPr>
-          </a:p>
-        </p:txBody>
-      </p:sp>
-      <p:sp>
-        <p:nvSpPr>
-          <p:cNvPr id="100" name="TextBox 28">
-            <a:extLst>
-              <a:ext uri="{FF2B5EF4-FFF2-40B4-BE49-F238E27FC236}">
-                <a16:creationId xmlns:a16="http://schemas.microsoft.com/office/drawing/2014/main" id="{DE38CA19-33F7-2CE6-5F2E-061B1E627F4C}"/>
-              </a:ext>
-            </a:extLst>
-          </p:cNvPr>
-          <p:cNvSpPr txBox="1"/>
-          <p:nvPr/>
-        </p:nvSpPr>
-        <p:spPr>
-          <a:xfrm>
-            <a:off x="5776274" y="89549"/>
-            <a:ext cx="2052083" cy="646331"/>
-          </a:xfrm>
-          <a:prstGeom prst="rect">
-            <a:avLst/>
-          </a:prstGeom>
-          <a:noFill/>
-        </p:spPr>
-        <p:txBody>
-          <a:bodyPr wrap="square" rtlCol="0">
-            <a:spAutoFit/>
-          </a:bodyPr>
-          <a:lstStyle/>
-          <a:p>
-            <a:pPr marL="0" marR="0" lvl="0" indent="0" algn="ctr" defTabSz="914400" eaLnBrk="1" fontAlgn="auto" latinLnBrk="0" hangingPunct="1">
-              <a:lnSpc>
-                <a:spcPct val="100000"/>
-              </a:lnSpc>
-              <a:spcBef>
-                <a:spcPts val="0"/>
-              </a:spcBef>
-              <a:spcAft>
-                <a:spcPts val="0"/>
-              </a:spcAft>
-              <a:buClrTx/>
-              <a:buSzTx/>
-              <a:buFontTx/>
-              <a:buNone/>
-              <a:tabLst/>
-              <a:defRPr/>
-            </a:pPr>
-            <a:r>
-              <a:rPr kumimoji="0" lang="en-US" sz="1800" b="0" i="0" u="none" strike="noStrike" kern="0" cap="none" spc="0" normalizeH="0" baseline="0" noProof="0" dirty="0">
-                <a:ln>
-                  <a:noFill/>
-                </a:ln>
-                <a:solidFill>
-                  <a:prstClr val="black"/>
-                </a:solidFill>
-                <a:effectLst/>
-                <a:uLnTx/>
-                <a:uFillTx/>
-              </a:rPr>
-              <a:t>Final</a:t>
-            </a:r>
-          </a:p>
-          <a:p>
-            <a:pPr marL="0" marR="0" lvl="0" indent="0" algn="ctr" defTabSz="914400" eaLnBrk="1" fontAlgn="auto" latinLnBrk="0" hangingPunct="1">
-              <a:lnSpc>
-                <a:spcPct val="100000"/>
-              </a:lnSpc>
-              <a:spcBef>
-                <a:spcPts val="0"/>
-              </a:spcBef>
-              <a:spcAft>
-                <a:spcPts val="0"/>
-              </a:spcAft>
-              <a:buClrTx/>
-              <a:buSzTx/>
-              <a:buFontTx/>
-              <a:buNone/>
-              <a:tabLst/>
-              <a:defRPr/>
-            </a:pPr>
-            <a:r>
-              <a:rPr kumimoji="0" lang="en-US" sz="1800" b="0" i="0" u="none" strike="noStrike" kern="0" cap="none" spc="0" normalizeH="0" baseline="0" noProof="0" dirty="0">
-                <a:ln>
-                  <a:noFill/>
-                </a:ln>
-                <a:solidFill>
-                  <a:prstClr val="black"/>
-                </a:solidFill>
-                <a:effectLst/>
-                <a:uLnTx/>
-                <a:uFillTx/>
-              </a:rPr>
-              <a:t> Energy</a:t>
-            </a:r>
-            <a:endParaRPr kumimoji="0" lang="en-GB" sz="1800" b="0" i="0" u="none" strike="noStrike" kern="0" cap="none" spc="0" normalizeH="0" baseline="0" noProof="0" dirty="0">
-              <a:ln>
-                <a:noFill/>
-              </a:ln>
-              <a:solidFill>
-                <a:prstClr val="black"/>
-              </a:solidFill>
-              <a:effectLst/>
-              <a:uLnTx/>
-              <a:uFillTx/>
-            </a:endParaRPr>
-          </a:p>
-        </p:txBody>
-      </p:sp>
-      <p:sp>
-        <p:nvSpPr>
-          <p:cNvPr id="103" name="Rectangle: Rounded Corners 26">
-            <a:extLst>
-              <a:ext uri="{FF2B5EF4-FFF2-40B4-BE49-F238E27FC236}">
-                <a16:creationId xmlns:a16="http://schemas.microsoft.com/office/drawing/2014/main" id="{A718ACD6-BD71-38C6-6A14-553A1585EADD}"/>
-              </a:ext>
-            </a:extLst>
-          </p:cNvPr>
-          <p:cNvSpPr/>
-          <p:nvPr/>
-        </p:nvSpPr>
-        <p:spPr>
-          <a:xfrm>
-            <a:off x="7075492" y="2699220"/>
-            <a:ext cx="1167812" cy="648098"/>
-          </a:xfrm>
-          <a:prstGeom prst="roundRect">
-            <a:avLst/>
-          </a:prstGeom>
-          <a:solidFill>
-            <a:srgbClr val="FFC000">
-              <a:lumMod val="60000"/>
-              <a:lumOff val="40000"/>
-            </a:srgbClr>
-          </a:solidFill>
-          <a:ln w="12700" cap="flat" cmpd="sng" algn="ctr">
-            <a:solidFill>
-              <a:srgbClr val="4472C4">
-                <a:shade val="50000"/>
-              </a:srgbClr>
-            </a:solidFill>
-            <a:prstDash val="solid"/>
-            <a:miter lim="800000"/>
-          </a:ln>
-          <a:effectLst>
-            <a:outerShdw blurRad="50800" dist="38100" dir="2700000" algn="tl" rotWithShape="0">
-              <a:prstClr val="black">
-                <a:alpha val="40000"/>
-              </a:prstClr>
-            </a:outerShdw>
-          </a:effectLst>
-        </p:spPr>
-        <p:txBody>
-          <a:bodyPr rtlCol="0" anchor="ctr"/>
-          <a:lstStyle/>
-          <a:p>
-            <a:pPr marL="0" marR="0" lvl="0" indent="0" algn="ctr" defTabSz="914400" eaLnBrk="1" fontAlgn="auto" latinLnBrk="0" hangingPunct="1">
-              <a:lnSpc>
-                <a:spcPct val="100000"/>
-              </a:lnSpc>
-              <a:spcBef>
-                <a:spcPts val="0"/>
-              </a:spcBef>
-              <a:spcAft>
-                <a:spcPts val="0"/>
-              </a:spcAft>
-              <a:buClrTx/>
-              <a:buSzTx/>
-              <a:buFontTx/>
-              <a:buNone/>
-              <a:tabLst/>
-              <a:defRPr/>
-            </a:pPr>
-            <a:r>
-              <a:rPr kumimoji="0" lang="en-US" sz="1400" b="0" i="0" u="none" strike="noStrike" kern="0" cap="none" spc="0" normalizeH="0" baseline="0" noProof="0" dirty="0">
-                <a:ln>
-                  <a:noFill/>
-                </a:ln>
-                <a:solidFill>
-                  <a:srgbClr val="44546A"/>
-                </a:solidFill>
-                <a:effectLst/>
-                <a:uLnTx/>
-                <a:uFillTx/>
-                <a:latin typeface="Calibri" panose="020F0502020204030204"/>
-                <a:ea typeface="+mn-ea"/>
-                <a:cs typeface="+mn-cs"/>
-              </a:rPr>
-              <a:t>Lightning</a:t>
-            </a:r>
-            <a:endParaRPr kumimoji="0" lang="en-GB" sz="1400" b="0" i="0" u="none" strike="noStrike" kern="0" cap="none" spc="0" normalizeH="0" baseline="0" noProof="0" dirty="0">
-              <a:ln>
-                <a:noFill/>
-              </a:ln>
-              <a:solidFill>
-                <a:srgbClr val="44546A"/>
-              </a:solidFill>
-              <a:effectLst/>
-              <a:uLnTx/>
-              <a:uFillTx/>
-              <a:latin typeface="Calibri" panose="020F0502020204030204"/>
-              <a:ea typeface="+mn-ea"/>
-              <a:cs typeface="+mn-cs"/>
-            </a:endParaRPr>
-          </a:p>
-        </p:txBody>
-      </p:sp>
-      <p:cxnSp>
-        <p:nvCxnSpPr>
-          <p:cNvPr id="104" name="Straight Connector 29">
-            <a:extLst>
-              <a:ext uri="{FF2B5EF4-FFF2-40B4-BE49-F238E27FC236}">
-                <a16:creationId xmlns:a16="http://schemas.microsoft.com/office/drawing/2014/main" id="{A6223F92-282E-D3DD-2213-AA0E48B953BE}"/>
-              </a:ext>
-            </a:extLst>
-          </p:cNvPr>
-          <p:cNvCxnSpPr>
-            <a:cxnSpLocks/>
-          </p:cNvCxnSpPr>
-          <p:nvPr/>
-        </p:nvCxnSpPr>
-        <p:spPr>
-          <a:xfrm>
-            <a:off x="8739515" y="1417673"/>
-            <a:ext cx="0" cy="4848446"/>
-          </a:xfrm>
-          <a:prstGeom prst="line">
-            <a:avLst/>
-          </a:prstGeom>
-          <a:noFill/>
-          <a:ln w="19050" cap="flat" cmpd="sng" algn="ctr">
-            <a:solidFill>
-              <a:srgbClr val="A5A5A5"/>
-            </a:solidFill>
-            <a:prstDash val="solid"/>
-            <a:miter lim="800000"/>
-          </a:ln>
-          <a:effectLst/>
-        </p:spPr>
-      </p:cxnSp>
-      <p:sp>
-        <p:nvSpPr>
-          <p:cNvPr id="105" name="TextBox 33">
-            <a:extLst>
-              <a:ext uri="{FF2B5EF4-FFF2-40B4-BE49-F238E27FC236}">
-                <a16:creationId xmlns:a16="http://schemas.microsoft.com/office/drawing/2014/main" id="{8F72C9BB-5B24-409C-AAF3-AF63DBC92C85}"/>
-              </a:ext>
-            </a:extLst>
-          </p:cNvPr>
-          <p:cNvSpPr txBox="1"/>
-          <p:nvPr/>
-        </p:nvSpPr>
-        <p:spPr>
-          <a:xfrm rot="16200000">
-            <a:off x="7904421" y="5380918"/>
-            <a:ext cx="1446028" cy="338554"/>
-          </a:xfrm>
-          <a:prstGeom prst="rect">
-            <a:avLst/>
-          </a:prstGeom>
-          <a:noFill/>
-        </p:spPr>
-        <p:txBody>
-          <a:bodyPr wrap="square" rtlCol="0">
-            <a:spAutoFit/>
-          </a:bodyPr>
-          <a:lstStyle/>
-          <a:p>
-            <a:pPr marL="0" marR="0" lvl="0" indent="0" defTabSz="914400" eaLnBrk="1" fontAlgn="auto" latinLnBrk="0" hangingPunct="1">
-              <a:lnSpc>
-                <a:spcPct val="100000"/>
-              </a:lnSpc>
-              <a:spcBef>
-                <a:spcPts val="0"/>
-              </a:spcBef>
-              <a:spcAft>
-                <a:spcPts val="0"/>
-              </a:spcAft>
-              <a:buClrTx/>
-              <a:buSzTx/>
-              <a:buFontTx/>
-              <a:buNone/>
-              <a:tabLst/>
-              <a:defRPr/>
-            </a:pPr>
-            <a:r>
-              <a:rPr kumimoji="0" lang="en-US" sz="1600" b="0" i="1" u="none" strike="noStrike" kern="0" cap="none" spc="0" normalizeH="0" baseline="0" noProof="0" dirty="0">
-                <a:ln>
-                  <a:noFill/>
-                </a:ln>
-                <a:solidFill>
-                  <a:prstClr val="black"/>
-                </a:solidFill>
-                <a:effectLst/>
-                <a:uLnTx/>
-                <a:uFillTx/>
-              </a:rPr>
-              <a:t>light</a:t>
-            </a:r>
-            <a:endParaRPr kumimoji="0" lang="en-GB" sz="1600" b="0" i="1" u="none" strike="noStrike" kern="0" cap="none" spc="0" normalizeH="0" baseline="0" noProof="0" dirty="0">
-              <a:ln>
-                <a:noFill/>
-              </a:ln>
-              <a:solidFill>
-                <a:prstClr val="black"/>
-              </a:solidFill>
-              <a:effectLst/>
-              <a:uLnTx/>
-              <a:uFillTx/>
-            </a:endParaRPr>
-          </a:p>
-        </p:txBody>
-      </p:sp>
-      <p:cxnSp>
-        <p:nvCxnSpPr>
-          <p:cNvPr id="106" name="Straight Arrow Connector 38">
-            <a:extLst>
-              <a:ext uri="{FF2B5EF4-FFF2-40B4-BE49-F238E27FC236}">
-                <a16:creationId xmlns:a16="http://schemas.microsoft.com/office/drawing/2014/main" id="{B9D0FF2D-099E-BBB6-3A8B-FB0460EFDD53}"/>
-              </a:ext>
-            </a:extLst>
-          </p:cNvPr>
-          <p:cNvCxnSpPr>
-            <a:cxnSpLocks/>
-          </p:cNvCxnSpPr>
-          <p:nvPr/>
-        </p:nvCxnSpPr>
-        <p:spPr>
-          <a:xfrm>
-            <a:off x="6582876" y="3023269"/>
-            <a:ext cx="490860" cy="0"/>
-          </a:xfrm>
-          <a:prstGeom prst="straightConnector1">
-            <a:avLst/>
-          </a:prstGeom>
-          <a:noFill/>
-          <a:ln w="19050" cap="flat" cmpd="sng" algn="ctr">
-            <a:solidFill>
-              <a:srgbClr val="A5A5A5"/>
-            </a:solidFill>
-            <a:prstDash val="solid"/>
-            <a:miter lim="800000"/>
-            <a:tailEnd type="triangle"/>
-          </a:ln>
-          <a:effectLst/>
-        </p:spPr>
-      </p:cxnSp>
-      <p:cxnSp>
-        <p:nvCxnSpPr>
-          <p:cNvPr id="107" name="Straight Arrow Connector 39">
-            <a:extLst>
-              <a:ext uri="{FF2B5EF4-FFF2-40B4-BE49-F238E27FC236}">
-                <a16:creationId xmlns:a16="http://schemas.microsoft.com/office/drawing/2014/main" id="{45F796AF-0CDF-F28D-4768-9389AD0ACA1E}"/>
-              </a:ext>
-            </a:extLst>
-          </p:cNvPr>
-          <p:cNvCxnSpPr>
-            <a:cxnSpLocks/>
-          </p:cNvCxnSpPr>
-          <p:nvPr/>
-        </p:nvCxnSpPr>
-        <p:spPr>
-          <a:xfrm>
-            <a:off x="8243304" y="3023269"/>
-            <a:ext cx="490860" cy="0"/>
-          </a:xfrm>
-          <a:prstGeom prst="straightConnector1">
-            <a:avLst/>
-          </a:prstGeom>
-          <a:noFill/>
-          <a:ln w="19050" cap="flat" cmpd="sng" algn="ctr">
-            <a:solidFill>
-              <a:srgbClr val="A5A5A5"/>
-            </a:solidFill>
-            <a:prstDash val="solid"/>
-            <a:miter lim="800000"/>
-            <a:tailEnd type="triangle"/>
-          </a:ln>
-          <a:effectLst/>
-        </p:spPr>
-      </p:cxnSp>
-      <p:sp>
-        <p:nvSpPr>
-          <p:cNvPr id="108" name="TextBox 30">
-            <a:extLst>
-              <a:ext uri="{FF2B5EF4-FFF2-40B4-BE49-F238E27FC236}">
-                <a16:creationId xmlns:a16="http://schemas.microsoft.com/office/drawing/2014/main" id="{5242947D-348A-81DE-597C-5A0B097E6E55}"/>
-              </a:ext>
-            </a:extLst>
-          </p:cNvPr>
-          <p:cNvSpPr txBox="1"/>
-          <p:nvPr/>
-        </p:nvSpPr>
-        <p:spPr>
-          <a:xfrm>
-            <a:off x="7837544" y="103706"/>
-            <a:ext cx="2052083" cy="646331"/>
-          </a:xfrm>
-          <a:prstGeom prst="rect">
-            <a:avLst/>
-          </a:prstGeom>
-          <a:noFill/>
-        </p:spPr>
-        <p:txBody>
-          <a:bodyPr wrap="square" rtlCol="0">
-            <a:spAutoFit/>
-          </a:bodyPr>
-          <a:lstStyle/>
-          <a:p>
-            <a:pPr marL="0" marR="0" lvl="0" indent="0" algn="ctr" defTabSz="914400" eaLnBrk="1" fontAlgn="auto" latinLnBrk="0" hangingPunct="1">
-              <a:lnSpc>
-                <a:spcPct val="100000"/>
-              </a:lnSpc>
-              <a:spcBef>
-                <a:spcPts val="0"/>
-              </a:spcBef>
-              <a:spcAft>
-                <a:spcPts val="0"/>
-              </a:spcAft>
-              <a:buClrTx/>
-              <a:buSzTx/>
-              <a:buFontTx/>
-              <a:buNone/>
-              <a:tabLst/>
-              <a:defRPr/>
-            </a:pPr>
-            <a:r>
-              <a:rPr kumimoji="0" lang="en-US" sz="1800" b="0" i="0" u="none" strike="noStrike" kern="0" cap="none" spc="0" normalizeH="0" baseline="0" noProof="0" dirty="0">
-                <a:ln>
-                  <a:noFill/>
-                </a:ln>
-                <a:solidFill>
-                  <a:prstClr val="black"/>
-                </a:solidFill>
-                <a:effectLst/>
-                <a:uLnTx/>
-                <a:uFillTx/>
-              </a:rPr>
-              <a:t>Useful</a:t>
-            </a:r>
-          </a:p>
-          <a:p>
-            <a:pPr marL="0" marR="0" lvl="0" indent="0" algn="ctr" defTabSz="914400" eaLnBrk="1" fontAlgn="auto" latinLnBrk="0" hangingPunct="1">
-              <a:lnSpc>
-                <a:spcPct val="100000"/>
-              </a:lnSpc>
-              <a:spcBef>
-                <a:spcPts val="0"/>
-              </a:spcBef>
-              <a:spcAft>
-                <a:spcPts val="0"/>
-              </a:spcAft>
-              <a:buClrTx/>
-              <a:buSzTx/>
-              <a:buFontTx/>
-              <a:buNone/>
-              <a:tabLst/>
-              <a:defRPr/>
-            </a:pPr>
-            <a:r>
-              <a:rPr kumimoji="0" lang="en-US" sz="1800" b="0" i="0" u="none" strike="noStrike" kern="0" cap="none" spc="0" normalizeH="0" baseline="0" noProof="0" dirty="0">
-                <a:ln>
-                  <a:noFill/>
-                </a:ln>
-                <a:solidFill>
-                  <a:prstClr val="black"/>
-                </a:solidFill>
-                <a:effectLst/>
-                <a:uLnTx/>
-                <a:uFillTx/>
-              </a:rPr>
-              <a:t> Energy</a:t>
-            </a:r>
-            <a:endParaRPr kumimoji="0" lang="en-GB" sz="1800" b="0" i="0" u="none" strike="noStrike" kern="0" cap="none" spc="0" normalizeH="0" baseline="0" noProof="0" dirty="0">
-              <a:ln>
-                <a:noFill/>
-              </a:ln>
-              <a:solidFill>
-                <a:prstClr val="black"/>
-              </a:solidFill>
-              <a:effectLst/>
-              <a:uLnTx/>
-              <a:uFillTx/>
-            </a:endParaRPr>
-          </a:p>
-        </p:txBody>
-      </p:sp>
-      <p:cxnSp>
-        <p:nvCxnSpPr>
-          <p:cNvPr id="2" name="Straight Arrow Connector 38">
-            <a:extLst>
-              <a:ext uri="{FF2B5EF4-FFF2-40B4-BE49-F238E27FC236}">
-                <a16:creationId xmlns:a16="http://schemas.microsoft.com/office/drawing/2014/main" id="{921501FE-817E-4497-F4D3-9B042DF0109E}"/>
-              </a:ext>
-            </a:extLst>
-          </p:cNvPr>
-          <p:cNvCxnSpPr>
-            <a:cxnSpLocks/>
-          </p:cNvCxnSpPr>
-          <p:nvPr/>
-        </p:nvCxnSpPr>
-        <p:spPr>
-          <a:xfrm flipH="1">
-            <a:off x="6574470" y="1916832"/>
-            <a:ext cx="499266" cy="0"/>
-          </a:xfrm>
-          <a:prstGeom prst="straightConnector1">
-            <a:avLst/>
-          </a:prstGeom>
-          <a:noFill/>
-          <a:ln w="19050" cap="flat" cmpd="sng" algn="ctr">
-            <a:solidFill>
-              <a:srgbClr val="A5A5A5"/>
-            </a:solidFill>
-            <a:prstDash val="solid"/>
-            <a:miter lim="800000"/>
-            <a:tailEnd type="triangle"/>
-          </a:ln>
-          <a:effectLst/>
-        </p:spPr>
-      </p:cxnSp>
     </p:spTree>
     <p:extLst>
       <p:ext uri="{BB962C8B-B14F-4D97-AF65-F5344CB8AC3E}">
-        <p14:creationId xmlns:p14="http://schemas.microsoft.com/office/powerpoint/2010/main" val="1887803004"/>
-      </p:ext>
-    </p:extLst>
-  </p:cSld>
-  <p:clrMapOvr>
-    <a:masterClrMapping/>
-  </p:clrMapOvr>
-</p:sld>
-</file>
-
-<file path=ppt/slides/slide5.xml><?xml version="1.0" encoding="utf-8"?>
-<p:sld xmlns:a="http://schemas.openxmlformats.org/drawingml/2006/main" xmlns:r="http://schemas.openxmlformats.org/officeDocument/2006/relationships" xmlns:p="http://schemas.openxmlformats.org/presentationml/2006/main">
-  <p:cSld>
-    <p:spTree>
-      <p:nvGrpSpPr>
-        <p:cNvPr id="1" name="">
-          <a:extLst>
-            <a:ext uri="{FF2B5EF4-FFF2-40B4-BE49-F238E27FC236}">
-              <a16:creationId xmlns:a16="http://schemas.microsoft.com/office/drawing/2014/main" id="{EFA9BC55-90A1-E5E1-F80F-1CFE4F901645}"/>
-            </a:ext>
-          </a:extLst>
-        </p:cNvPr>
-        <p:cNvGrpSpPr/>
-        <p:nvPr/>
-      </p:nvGrpSpPr>
-      <p:grpSpPr>
-        <a:xfrm>
-          <a:off x="0" y="0"/>
-          <a:ext cx="0" cy="0"/>
-          <a:chOff x="0" y="0"/>
-          <a:chExt cx="0" cy="0"/>
-        </a:xfrm>
-      </p:grpSpPr>
-      <p:pic>
-        <p:nvPicPr>
-          <p:cNvPr id="82" name="Picture 4" descr="A picture containing tree&#10;&#10;Description automatically generated">
-            <a:extLst>
-              <a:ext uri="{FF2B5EF4-FFF2-40B4-BE49-F238E27FC236}">
-                <a16:creationId xmlns:a16="http://schemas.microsoft.com/office/drawing/2014/main" id="{CD26F56F-8E08-E389-F95B-87306AF4608C}"/>
-              </a:ext>
-            </a:extLst>
-          </p:cNvPr>
-          <p:cNvPicPr>
-            <a:picLocks noChangeAspect="1"/>
-          </p:cNvPicPr>
-          <p:nvPr/>
-        </p:nvPicPr>
-        <p:blipFill>
-          <a:blip r:embed="rId3">
-            <a:extLst>
-              <a:ext uri="{28A0092B-C50C-407E-A947-70E740481C1C}">
-                <a14:useLocalDpi xmlns:a14="http://schemas.microsoft.com/office/drawing/2010/main" val="0"/>
-              </a:ext>
-            </a:extLst>
-          </a:blip>
-          <a:stretch>
-            <a:fillRect/>
-          </a:stretch>
-        </p:blipFill>
-        <p:spPr>
-          <a:xfrm>
-            <a:off x="80282" y="90975"/>
-            <a:ext cx="1748518" cy="6650067"/>
-          </a:xfrm>
-          <a:prstGeom prst="rect">
-            <a:avLst/>
-          </a:prstGeom>
-        </p:spPr>
-      </p:pic>
-      <p:sp>
-        <p:nvSpPr>
-          <p:cNvPr id="83" name="Rectangle: Rounded Corners 5">
-            <a:extLst>
-              <a:ext uri="{FF2B5EF4-FFF2-40B4-BE49-F238E27FC236}">
-                <a16:creationId xmlns:a16="http://schemas.microsoft.com/office/drawing/2014/main" id="{17CBC95F-D4B0-E994-B013-1BB77F48D13A}"/>
-              </a:ext>
-            </a:extLst>
-          </p:cNvPr>
-          <p:cNvSpPr/>
-          <p:nvPr/>
-        </p:nvSpPr>
-        <p:spPr>
-          <a:xfrm>
-            <a:off x="2770671" y="2158409"/>
-            <a:ext cx="1167812" cy="648098"/>
-          </a:xfrm>
-          <a:prstGeom prst="roundRect">
-            <a:avLst/>
-          </a:prstGeom>
-          <a:solidFill>
-            <a:srgbClr val="4472C4"/>
-          </a:solidFill>
-          <a:ln w="12700" cap="flat" cmpd="sng" algn="ctr">
-            <a:solidFill>
-              <a:srgbClr val="4472C4">
-                <a:shade val="50000"/>
-              </a:srgbClr>
-            </a:solidFill>
-            <a:prstDash val="solid"/>
-            <a:miter lim="800000"/>
-          </a:ln>
-          <a:effectLst>
-            <a:outerShdw blurRad="50800" dist="38100" dir="2700000" algn="tl" rotWithShape="0">
-              <a:prstClr val="black">
-                <a:alpha val="40000"/>
-              </a:prstClr>
-            </a:outerShdw>
-          </a:effectLst>
-        </p:spPr>
-        <p:txBody>
-          <a:bodyPr rtlCol="0" anchor="ctr"/>
-          <a:lstStyle/>
-          <a:p>
-            <a:pPr marL="0" marR="0" lvl="0" indent="0" algn="ctr" defTabSz="914400" eaLnBrk="1" fontAlgn="auto" latinLnBrk="0" hangingPunct="1">
-              <a:lnSpc>
-                <a:spcPct val="100000"/>
-              </a:lnSpc>
-              <a:spcBef>
-                <a:spcPts val="0"/>
-              </a:spcBef>
-              <a:spcAft>
-                <a:spcPts val="0"/>
-              </a:spcAft>
-              <a:buClrTx/>
-              <a:buSzTx/>
-              <a:buFontTx/>
-              <a:buNone/>
-              <a:tabLst/>
-              <a:defRPr/>
-            </a:pPr>
-            <a:r>
-              <a:rPr kumimoji="0" lang="en-US" sz="1400" b="0" i="0" u="none" strike="noStrike" kern="0" cap="none" spc="0" normalizeH="0" baseline="0" noProof="0" dirty="0">
-                <a:ln>
-                  <a:noFill/>
-                </a:ln>
-                <a:solidFill>
-                  <a:prstClr val="white"/>
-                </a:solidFill>
-                <a:effectLst/>
-                <a:uLnTx/>
-                <a:uFillTx/>
-                <a:latin typeface="Calibri" panose="020F0502020204030204"/>
-                <a:ea typeface="+mn-ea"/>
-                <a:cs typeface="+mn-cs"/>
-              </a:rPr>
-              <a:t>Coal Power plant</a:t>
-            </a:r>
-            <a:endParaRPr kumimoji="0" lang="en-GB" sz="1400" b="0" i="0" u="none" strike="noStrike" kern="0" cap="none" spc="0" normalizeH="0" baseline="0" noProof="0" dirty="0">
-              <a:ln>
-                <a:noFill/>
-              </a:ln>
-              <a:solidFill>
-                <a:prstClr val="white"/>
-              </a:solidFill>
-              <a:effectLst/>
-              <a:uLnTx/>
-              <a:uFillTx/>
-              <a:latin typeface="Calibri" panose="020F0502020204030204"/>
-              <a:ea typeface="+mn-ea"/>
-              <a:cs typeface="+mn-cs"/>
-            </a:endParaRPr>
-          </a:p>
-        </p:txBody>
-      </p:sp>
-      <p:sp>
-        <p:nvSpPr>
-          <p:cNvPr id="84" name="Rectangle: Rounded Corners 7">
-            <a:extLst>
-              <a:ext uri="{FF2B5EF4-FFF2-40B4-BE49-F238E27FC236}">
-                <a16:creationId xmlns:a16="http://schemas.microsoft.com/office/drawing/2014/main" id="{3E00B13D-E5BE-2BA5-2F1E-DC36C5755F5F}"/>
-              </a:ext>
-            </a:extLst>
-          </p:cNvPr>
-          <p:cNvSpPr/>
-          <p:nvPr/>
-        </p:nvSpPr>
-        <p:spPr>
-          <a:xfrm>
-            <a:off x="2770671" y="3452194"/>
-            <a:ext cx="1167812" cy="648098"/>
-          </a:xfrm>
-          <a:prstGeom prst="roundRect">
-            <a:avLst/>
-          </a:prstGeom>
-          <a:solidFill>
-            <a:srgbClr val="4472C4"/>
-          </a:solidFill>
-          <a:ln w="12700" cap="flat" cmpd="sng" algn="ctr">
-            <a:solidFill>
-              <a:srgbClr val="4472C4">
-                <a:shade val="50000"/>
-              </a:srgbClr>
-            </a:solidFill>
-            <a:prstDash val="solid"/>
-            <a:miter lim="800000"/>
-          </a:ln>
-          <a:effectLst>
-            <a:outerShdw blurRad="50800" dist="38100" dir="2700000" algn="tl" rotWithShape="0">
-              <a:prstClr val="black">
-                <a:alpha val="40000"/>
-              </a:prstClr>
-            </a:outerShdw>
-          </a:effectLst>
-        </p:spPr>
-        <p:txBody>
-          <a:bodyPr rtlCol="0" anchor="ctr"/>
-          <a:lstStyle/>
-          <a:p>
-            <a:pPr marL="0" marR="0" lvl="0" indent="0" algn="ctr" defTabSz="914400" eaLnBrk="1" fontAlgn="auto" latinLnBrk="0" hangingPunct="1">
-              <a:lnSpc>
-                <a:spcPct val="100000"/>
-              </a:lnSpc>
-              <a:spcBef>
-                <a:spcPts val="0"/>
-              </a:spcBef>
-              <a:spcAft>
-                <a:spcPts val="0"/>
-              </a:spcAft>
-              <a:buClrTx/>
-              <a:buSzTx/>
-              <a:buFontTx/>
-              <a:buNone/>
-              <a:tabLst/>
-              <a:defRPr/>
-            </a:pPr>
-            <a:r>
-              <a:rPr kumimoji="0" lang="en-US" sz="1400" b="0" i="0" u="none" strike="noStrike" kern="0" cap="none" spc="0" normalizeH="0" baseline="0" noProof="0" dirty="0">
-                <a:ln>
-                  <a:noFill/>
-                </a:ln>
-                <a:solidFill>
-                  <a:prstClr val="white"/>
-                </a:solidFill>
-                <a:effectLst/>
-                <a:uLnTx/>
-                <a:uFillTx/>
-                <a:latin typeface="Calibri" panose="020F0502020204030204"/>
-                <a:ea typeface="+mn-ea"/>
-                <a:cs typeface="+mn-cs"/>
-              </a:rPr>
-              <a:t>Wind Power plant</a:t>
-            </a:r>
-            <a:endParaRPr kumimoji="0" lang="en-GB" sz="1400" b="0" i="0" u="none" strike="noStrike" kern="0" cap="none" spc="0" normalizeH="0" baseline="0" noProof="0" dirty="0">
-              <a:ln>
-                <a:noFill/>
-              </a:ln>
-              <a:solidFill>
-                <a:prstClr val="white"/>
-              </a:solidFill>
-              <a:effectLst/>
-              <a:uLnTx/>
-              <a:uFillTx/>
-              <a:latin typeface="Calibri" panose="020F0502020204030204"/>
-              <a:ea typeface="+mn-ea"/>
-              <a:cs typeface="+mn-cs"/>
-            </a:endParaRPr>
-          </a:p>
-        </p:txBody>
-      </p:sp>
-      <p:cxnSp>
-        <p:nvCxnSpPr>
-          <p:cNvPr id="85" name="Straight Connector 9">
-            <a:extLst>
-              <a:ext uri="{FF2B5EF4-FFF2-40B4-BE49-F238E27FC236}">
-                <a16:creationId xmlns:a16="http://schemas.microsoft.com/office/drawing/2014/main" id="{875900E8-538A-5E49-6D85-E9ACEB84B57F}"/>
-              </a:ext>
-            </a:extLst>
-          </p:cNvPr>
-          <p:cNvCxnSpPr>
-            <a:cxnSpLocks/>
-          </p:cNvCxnSpPr>
-          <p:nvPr/>
-        </p:nvCxnSpPr>
-        <p:spPr>
-          <a:xfrm>
-            <a:off x="4427572" y="1424763"/>
-            <a:ext cx="0" cy="4848446"/>
-          </a:xfrm>
-          <a:prstGeom prst="line">
-            <a:avLst/>
-          </a:prstGeom>
-          <a:noFill/>
-          <a:ln w="19050" cap="flat" cmpd="sng" algn="ctr">
-            <a:solidFill>
-              <a:srgbClr val="A5A5A5"/>
-            </a:solidFill>
-            <a:prstDash val="solid"/>
-            <a:miter lim="800000"/>
-          </a:ln>
-          <a:effectLst/>
-        </p:spPr>
-      </p:cxnSp>
-      <p:sp>
-        <p:nvSpPr>
-          <p:cNvPr id="86" name="TextBox 11">
-            <a:extLst>
-              <a:ext uri="{FF2B5EF4-FFF2-40B4-BE49-F238E27FC236}">
-                <a16:creationId xmlns:a16="http://schemas.microsoft.com/office/drawing/2014/main" id="{582C02C8-A33D-0D16-295E-C131B7882791}"/>
-              </a:ext>
-            </a:extLst>
-          </p:cNvPr>
-          <p:cNvSpPr txBox="1"/>
-          <p:nvPr/>
-        </p:nvSpPr>
-        <p:spPr>
-          <a:xfrm rot="16200000">
-            <a:off x="3598236" y="5380918"/>
-            <a:ext cx="1446028" cy="338554"/>
-          </a:xfrm>
-          <a:prstGeom prst="rect">
-            <a:avLst/>
-          </a:prstGeom>
-          <a:noFill/>
-        </p:spPr>
-        <p:txBody>
-          <a:bodyPr wrap="square" rtlCol="0">
-            <a:spAutoFit/>
-          </a:bodyPr>
-          <a:lstStyle/>
-          <a:p>
-            <a:pPr marL="0" marR="0" lvl="0" indent="0" defTabSz="914400" eaLnBrk="1" fontAlgn="auto" latinLnBrk="0" hangingPunct="1">
-              <a:lnSpc>
-                <a:spcPct val="100000"/>
-              </a:lnSpc>
-              <a:spcBef>
-                <a:spcPts val="0"/>
-              </a:spcBef>
-              <a:spcAft>
-                <a:spcPts val="0"/>
-              </a:spcAft>
-              <a:buClrTx/>
-              <a:buSzTx/>
-              <a:buFontTx/>
-              <a:buNone/>
-              <a:tabLst/>
-              <a:defRPr/>
-            </a:pPr>
-            <a:r>
-              <a:rPr kumimoji="0" lang="en-US" sz="1600" b="0" i="1" u="none" strike="noStrike" kern="0" cap="none" spc="0" normalizeH="0" baseline="0" noProof="0" dirty="0">
-                <a:ln>
-                  <a:noFill/>
-                </a:ln>
-                <a:solidFill>
-                  <a:prstClr val="black"/>
-                </a:solidFill>
-                <a:effectLst/>
-                <a:uLnTx/>
-                <a:uFillTx/>
-              </a:rPr>
-              <a:t>electricity</a:t>
-            </a:r>
-            <a:endParaRPr kumimoji="0" lang="en-GB" sz="1600" b="0" i="1" u="none" strike="noStrike" kern="0" cap="none" spc="0" normalizeH="0" baseline="0" noProof="0" dirty="0">
-              <a:ln>
-                <a:noFill/>
-              </a:ln>
-              <a:solidFill>
-                <a:prstClr val="black"/>
-              </a:solidFill>
-              <a:effectLst/>
-              <a:uLnTx/>
-              <a:uFillTx/>
-            </a:endParaRPr>
-          </a:p>
-        </p:txBody>
-      </p:sp>
-      <p:cxnSp>
-        <p:nvCxnSpPr>
-          <p:cNvPr id="87" name="Straight Arrow Connector 18">
-            <a:extLst>
-              <a:ext uri="{FF2B5EF4-FFF2-40B4-BE49-F238E27FC236}">
-                <a16:creationId xmlns:a16="http://schemas.microsoft.com/office/drawing/2014/main" id="{DEC405A3-1ED9-A654-AB9B-1E827592B74F}"/>
-              </a:ext>
-            </a:extLst>
-          </p:cNvPr>
-          <p:cNvCxnSpPr>
-            <a:cxnSpLocks/>
-          </p:cNvCxnSpPr>
-          <p:nvPr/>
-        </p:nvCxnSpPr>
-        <p:spPr>
-          <a:xfrm>
-            <a:off x="3949116" y="2463287"/>
-            <a:ext cx="490860" cy="0"/>
-          </a:xfrm>
-          <a:prstGeom prst="straightConnector1">
-            <a:avLst/>
-          </a:prstGeom>
-          <a:noFill/>
-          <a:ln w="19050" cap="flat" cmpd="sng" algn="ctr">
-            <a:solidFill>
-              <a:srgbClr val="A5A5A5"/>
-            </a:solidFill>
-            <a:prstDash val="solid"/>
-            <a:miter lim="800000"/>
-            <a:tailEnd type="triangle"/>
-          </a:ln>
-          <a:effectLst/>
-        </p:spPr>
-      </p:cxnSp>
-      <p:sp>
-        <p:nvSpPr>
-          <p:cNvPr id="88" name="Rectangle: Rounded Corners 20">
-            <a:extLst>
-              <a:ext uri="{FF2B5EF4-FFF2-40B4-BE49-F238E27FC236}">
-                <a16:creationId xmlns:a16="http://schemas.microsoft.com/office/drawing/2014/main" id="{8261FC71-1552-48A0-8F23-893B0EA5FB5A}"/>
-              </a:ext>
-            </a:extLst>
-          </p:cNvPr>
-          <p:cNvSpPr/>
-          <p:nvPr/>
-        </p:nvSpPr>
-        <p:spPr>
-          <a:xfrm>
-            <a:off x="4928188" y="2701159"/>
-            <a:ext cx="1167812" cy="648098"/>
-          </a:xfrm>
-          <a:prstGeom prst="roundRect">
-            <a:avLst/>
-          </a:prstGeom>
-          <a:solidFill>
-            <a:srgbClr val="A5A5A5"/>
-          </a:solidFill>
-          <a:ln w="12700" cap="flat" cmpd="sng" algn="ctr">
-            <a:solidFill>
-              <a:srgbClr val="4472C4">
-                <a:shade val="50000"/>
-              </a:srgbClr>
-            </a:solidFill>
-            <a:prstDash val="solid"/>
-            <a:miter lim="800000"/>
-          </a:ln>
-          <a:effectLst>
-            <a:outerShdw blurRad="50800" dist="38100" dir="2700000" algn="tl" rotWithShape="0">
-              <a:prstClr val="black">
-                <a:alpha val="40000"/>
-              </a:prstClr>
-            </a:outerShdw>
-          </a:effectLst>
-        </p:spPr>
-        <p:txBody>
-          <a:bodyPr rtlCol="0" anchor="ctr"/>
-          <a:lstStyle/>
-          <a:p>
-            <a:pPr marL="0" marR="0" lvl="0" indent="0" algn="ctr" defTabSz="914400" eaLnBrk="1" fontAlgn="auto" latinLnBrk="0" hangingPunct="1">
-              <a:lnSpc>
-                <a:spcPct val="100000"/>
-              </a:lnSpc>
-              <a:spcBef>
-                <a:spcPts val="0"/>
-              </a:spcBef>
-              <a:spcAft>
-                <a:spcPts val="0"/>
-              </a:spcAft>
-              <a:buClrTx/>
-              <a:buSzTx/>
-              <a:buFontTx/>
-              <a:buNone/>
-              <a:tabLst/>
-              <a:defRPr/>
-            </a:pPr>
-            <a:r>
-              <a:rPr kumimoji="0" lang="en-US" sz="1400" b="0" i="0" u="none" strike="noStrike" kern="0" cap="none" spc="0" normalizeH="0" baseline="0" noProof="0" dirty="0">
-                <a:ln>
-                  <a:noFill/>
-                </a:ln>
-                <a:solidFill>
-                  <a:prstClr val="white"/>
-                </a:solidFill>
-                <a:effectLst/>
-                <a:uLnTx/>
-                <a:uFillTx/>
-                <a:latin typeface="Calibri" panose="020F0502020204030204"/>
-                <a:ea typeface="+mn-ea"/>
-                <a:cs typeface="+mn-cs"/>
-              </a:rPr>
-              <a:t>Electricity grid</a:t>
-            </a:r>
-            <a:endParaRPr kumimoji="0" lang="en-GB" sz="1400" b="0" i="0" u="none" strike="noStrike" kern="0" cap="none" spc="0" normalizeH="0" baseline="0" noProof="0" dirty="0">
-              <a:ln>
-                <a:noFill/>
-              </a:ln>
-              <a:solidFill>
-                <a:prstClr val="white"/>
-              </a:solidFill>
-              <a:effectLst/>
-              <a:uLnTx/>
-              <a:uFillTx/>
-              <a:latin typeface="Calibri" panose="020F0502020204030204"/>
-              <a:ea typeface="+mn-ea"/>
-              <a:cs typeface="+mn-cs"/>
-            </a:endParaRPr>
-          </a:p>
-        </p:txBody>
-      </p:sp>
-      <p:cxnSp>
-        <p:nvCxnSpPr>
-          <p:cNvPr id="89" name="Straight Connector 23">
-            <a:extLst>
-              <a:ext uri="{FF2B5EF4-FFF2-40B4-BE49-F238E27FC236}">
-                <a16:creationId xmlns:a16="http://schemas.microsoft.com/office/drawing/2014/main" id="{F1F47A76-FAB3-255E-0882-F84CE1FFBBD7}"/>
-              </a:ext>
-            </a:extLst>
-          </p:cNvPr>
-          <p:cNvCxnSpPr>
-            <a:cxnSpLocks/>
-          </p:cNvCxnSpPr>
-          <p:nvPr/>
-        </p:nvCxnSpPr>
-        <p:spPr>
-          <a:xfrm>
-            <a:off x="6574470" y="1414130"/>
-            <a:ext cx="0" cy="4848446"/>
-          </a:xfrm>
-          <a:prstGeom prst="line">
-            <a:avLst/>
-          </a:prstGeom>
-          <a:noFill/>
-          <a:ln w="19050" cap="flat" cmpd="sng" algn="ctr">
-            <a:solidFill>
-              <a:srgbClr val="A5A5A5"/>
-            </a:solidFill>
-            <a:prstDash val="solid"/>
-            <a:miter lim="800000"/>
-          </a:ln>
-          <a:effectLst/>
-        </p:spPr>
-      </p:cxnSp>
-      <p:sp>
-        <p:nvSpPr>
-          <p:cNvPr id="90" name="TextBox 24">
-            <a:extLst>
-              <a:ext uri="{FF2B5EF4-FFF2-40B4-BE49-F238E27FC236}">
-                <a16:creationId xmlns:a16="http://schemas.microsoft.com/office/drawing/2014/main" id="{DC47A9E5-18EB-3929-441D-8E53D00234B6}"/>
-              </a:ext>
-            </a:extLst>
-          </p:cNvPr>
-          <p:cNvSpPr txBox="1"/>
-          <p:nvPr/>
-        </p:nvSpPr>
-        <p:spPr>
-          <a:xfrm rot="16200000">
-            <a:off x="5745134" y="5370285"/>
-            <a:ext cx="1446028" cy="338554"/>
-          </a:xfrm>
-          <a:prstGeom prst="rect">
-            <a:avLst/>
-          </a:prstGeom>
-          <a:noFill/>
-        </p:spPr>
-        <p:txBody>
-          <a:bodyPr wrap="square" rtlCol="0">
-            <a:spAutoFit/>
-          </a:bodyPr>
-          <a:lstStyle/>
-          <a:p>
-            <a:pPr marL="0" marR="0" lvl="0" indent="0" defTabSz="914400" eaLnBrk="1" fontAlgn="auto" latinLnBrk="0" hangingPunct="1">
-              <a:lnSpc>
-                <a:spcPct val="100000"/>
-              </a:lnSpc>
-              <a:spcBef>
-                <a:spcPts val="0"/>
-              </a:spcBef>
-              <a:spcAft>
-                <a:spcPts val="0"/>
-              </a:spcAft>
-              <a:buClrTx/>
-              <a:buSzTx/>
-              <a:buFontTx/>
-              <a:buNone/>
-              <a:tabLst/>
-              <a:defRPr/>
-            </a:pPr>
-            <a:r>
-              <a:rPr kumimoji="0" lang="en-US" sz="1600" b="0" i="1" u="none" strike="noStrike" kern="0" cap="none" spc="0" normalizeH="0" baseline="0" noProof="0" dirty="0">
-                <a:ln>
-                  <a:noFill/>
-                </a:ln>
-                <a:solidFill>
-                  <a:prstClr val="black"/>
-                </a:solidFill>
-                <a:effectLst/>
-                <a:uLnTx/>
-                <a:uFillTx/>
-              </a:rPr>
-              <a:t>electricity</a:t>
-            </a:r>
-            <a:endParaRPr kumimoji="0" lang="en-GB" sz="1600" b="0" i="1" u="none" strike="noStrike" kern="0" cap="none" spc="0" normalizeH="0" baseline="0" noProof="0" dirty="0">
-              <a:ln>
-                <a:noFill/>
-              </a:ln>
-              <a:solidFill>
-                <a:prstClr val="black"/>
-              </a:solidFill>
-              <a:effectLst/>
-              <a:uLnTx/>
-              <a:uFillTx/>
-            </a:endParaRPr>
-          </a:p>
-        </p:txBody>
-      </p:sp>
-      <p:sp>
-        <p:nvSpPr>
-          <p:cNvPr id="91" name="Rectangle: Rounded Corners 26">
-            <a:extLst>
-              <a:ext uri="{FF2B5EF4-FFF2-40B4-BE49-F238E27FC236}">
-                <a16:creationId xmlns:a16="http://schemas.microsoft.com/office/drawing/2014/main" id="{CE61C593-775B-608D-4E91-D9613B9A03BB}"/>
-              </a:ext>
-            </a:extLst>
-          </p:cNvPr>
-          <p:cNvSpPr/>
-          <p:nvPr/>
-        </p:nvSpPr>
-        <p:spPr>
-          <a:xfrm>
-            <a:off x="7079476" y="2699220"/>
-            <a:ext cx="1167812" cy="648098"/>
-          </a:xfrm>
-          <a:prstGeom prst="roundRect">
-            <a:avLst/>
-          </a:prstGeom>
-          <a:solidFill>
-            <a:srgbClr val="FFC000">
-              <a:lumMod val="60000"/>
-              <a:lumOff val="40000"/>
-            </a:srgbClr>
-          </a:solidFill>
-          <a:ln w="12700" cap="flat" cmpd="sng" algn="ctr">
-            <a:solidFill>
-              <a:srgbClr val="4472C4">
-                <a:shade val="50000"/>
-              </a:srgbClr>
-            </a:solidFill>
-            <a:prstDash val="solid"/>
-            <a:miter lim="800000"/>
-          </a:ln>
-          <a:effectLst>
-            <a:outerShdw blurRad="50800" dist="38100" dir="2700000" algn="tl" rotWithShape="0">
-              <a:prstClr val="black">
-                <a:alpha val="40000"/>
-              </a:prstClr>
-            </a:outerShdw>
-          </a:effectLst>
-        </p:spPr>
-        <p:txBody>
-          <a:bodyPr rtlCol="0" anchor="ctr"/>
-          <a:lstStyle/>
-          <a:p>
-            <a:pPr marL="0" marR="0" lvl="0" indent="0" algn="ctr" defTabSz="914400" eaLnBrk="1" fontAlgn="auto" latinLnBrk="0" hangingPunct="1">
-              <a:lnSpc>
-                <a:spcPct val="100000"/>
-              </a:lnSpc>
-              <a:spcBef>
-                <a:spcPts val="0"/>
-              </a:spcBef>
-              <a:spcAft>
-                <a:spcPts val="0"/>
-              </a:spcAft>
-              <a:buClrTx/>
-              <a:buSzTx/>
-              <a:buFontTx/>
-              <a:buNone/>
-              <a:tabLst/>
-              <a:defRPr/>
-            </a:pPr>
-            <a:r>
-              <a:rPr kumimoji="0" lang="en-US" sz="1400" b="0" i="0" u="none" strike="noStrike" kern="0" cap="none" spc="0" normalizeH="0" baseline="0" noProof="0" dirty="0">
-                <a:ln>
-                  <a:noFill/>
-                </a:ln>
-                <a:solidFill>
-                  <a:srgbClr val="44546A"/>
-                </a:solidFill>
-                <a:effectLst/>
-                <a:uLnTx/>
-                <a:uFillTx/>
-                <a:latin typeface="Calibri" panose="020F0502020204030204"/>
-                <a:ea typeface="+mn-ea"/>
-                <a:cs typeface="+mn-cs"/>
-              </a:rPr>
-              <a:t>Electric Households</a:t>
-            </a:r>
-            <a:endParaRPr kumimoji="0" lang="en-GB" sz="1400" b="0" i="0" u="none" strike="noStrike" kern="0" cap="none" spc="0" normalizeH="0" baseline="0" noProof="0" dirty="0">
-              <a:ln>
-                <a:noFill/>
-              </a:ln>
-              <a:solidFill>
-                <a:srgbClr val="44546A"/>
-              </a:solidFill>
-              <a:effectLst/>
-              <a:uLnTx/>
-              <a:uFillTx/>
-              <a:latin typeface="Calibri" panose="020F0502020204030204"/>
-              <a:ea typeface="+mn-ea"/>
-              <a:cs typeface="+mn-cs"/>
-            </a:endParaRPr>
-          </a:p>
-        </p:txBody>
-      </p:sp>
-      <p:cxnSp>
-        <p:nvCxnSpPr>
-          <p:cNvPr id="92" name="Straight Connector 29">
-            <a:extLst>
-              <a:ext uri="{FF2B5EF4-FFF2-40B4-BE49-F238E27FC236}">
-                <a16:creationId xmlns:a16="http://schemas.microsoft.com/office/drawing/2014/main" id="{07B0731B-AFC4-7555-C8EA-645B02C136F6}"/>
-              </a:ext>
-            </a:extLst>
-          </p:cNvPr>
-          <p:cNvCxnSpPr>
-            <a:cxnSpLocks/>
-          </p:cNvCxnSpPr>
-          <p:nvPr/>
-        </p:nvCxnSpPr>
-        <p:spPr>
-          <a:xfrm>
-            <a:off x="8743499" y="1417673"/>
-            <a:ext cx="0" cy="4848446"/>
-          </a:xfrm>
-          <a:prstGeom prst="line">
-            <a:avLst/>
-          </a:prstGeom>
-          <a:noFill/>
-          <a:ln w="19050" cap="flat" cmpd="sng" algn="ctr">
-            <a:solidFill>
-              <a:srgbClr val="A5A5A5"/>
-            </a:solidFill>
-            <a:prstDash val="solid"/>
-            <a:miter lim="800000"/>
-          </a:ln>
-          <a:effectLst/>
-        </p:spPr>
-      </p:cxnSp>
-      <p:sp>
-        <p:nvSpPr>
-          <p:cNvPr id="93" name="TextBox 33">
-            <a:extLst>
-              <a:ext uri="{FF2B5EF4-FFF2-40B4-BE49-F238E27FC236}">
-                <a16:creationId xmlns:a16="http://schemas.microsoft.com/office/drawing/2014/main" id="{324D07D0-B19E-FA0B-F715-FA712810FE6E}"/>
-              </a:ext>
-            </a:extLst>
-          </p:cNvPr>
-          <p:cNvSpPr txBox="1"/>
-          <p:nvPr/>
-        </p:nvSpPr>
-        <p:spPr>
-          <a:xfrm rot="16200000">
-            <a:off x="7908405" y="5380918"/>
-            <a:ext cx="1446028" cy="338554"/>
-          </a:xfrm>
-          <a:prstGeom prst="rect">
-            <a:avLst/>
-          </a:prstGeom>
-          <a:noFill/>
-        </p:spPr>
-        <p:txBody>
-          <a:bodyPr wrap="square" rtlCol="0">
-            <a:spAutoFit/>
-          </a:bodyPr>
-          <a:lstStyle/>
-          <a:p>
-            <a:pPr marL="0" marR="0" lvl="0" indent="0" defTabSz="914400" eaLnBrk="1" fontAlgn="auto" latinLnBrk="0" hangingPunct="1">
-              <a:lnSpc>
-                <a:spcPct val="100000"/>
-              </a:lnSpc>
-              <a:spcBef>
-                <a:spcPts val="0"/>
-              </a:spcBef>
-              <a:spcAft>
-                <a:spcPts val="0"/>
-              </a:spcAft>
-              <a:buClrTx/>
-              <a:buSzTx/>
-              <a:buFontTx/>
-              <a:buNone/>
-              <a:tabLst/>
-              <a:defRPr/>
-            </a:pPr>
-            <a:r>
-              <a:rPr kumimoji="0" lang="en-US" sz="1600" b="0" i="1" u="none" strike="noStrike" kern="0" cap="none" spc="0" normalizeH="0" baseline="0" noProof="0" dirty="0">
-                <a:ln>
-                  <a:noFill/>
-                </a:ln>
-                <a:solidFill>
-                  <a:prstClr val="black"/>
-                </a:solidFill>
-                <a:effectLst/>
-                <a:uLnTx/>
-                <a:uFillTx/>
-              </a:rPr>
-              <a:t>electricity</a:t>
-            </a:r>
-            <a:endParaRPr kumimoji="0" lang="en-GB" sz="1600" b="0" i="1" u="none" strike="noStrike" kern="0" cap="none" spc="0" normalizeH="0" baseline="0" noProof="0" dirty="0">
-              <a:ln>
-                <a:noFill/>
-              </a:ln>
-              <a:solidFill>
-                <a:prstClr val="black"/>
-              </a:solidFill>
-              <a:effectLst/>
-              <a:uLnTx/>
-              <a:uFillTx/>
-            </a:endParaRPr>
-          </a:p>
-        </p:txBody>
-      </p:sp>
-      <p:cxnSp>
-        <p:nvCxnSpPr>
-          <p:cNvPr id="94" name="Straight Arrow Connector 35">
-            <a:extLst>
-              <a:ext uri="{FF2B5EF4-FFF2-40B4-BE49-F238E27FC236}">
-                <a16:creationId xmlns:a16="http://schemas.microsoft.com/office/drawing/2014/main" id="{66EB626B-0650-3A43-A2EA-C11A14C990D9}"/>
-              </a:ext>
-            </a:extLst>
-          </p:cNvPr>
-          <p:cNvCxnSpPr>
-            <a:cxnSpLocks/>
-          </p:cNvCxnSpPr>
-          <p:nvPr/>
-        </p:nvCxnSpPr>
-        <p:spPr>
-          <a:xfrm>
-            <a:off x="3938483" y="3817166"/>
-            <a:ext cx="490860" cy="0"/>
-          </a:xfrm>
-          <a:prstGeom prst="straightConnector1">
-            <a:avLst/>
-          </a:prstGeom>
-          <a:noFill/>
-          <a:ln w="19050" cap="flat" cmpd="sng" algn="ctr">
-            <a:solidFill>
-              <a:srgbClr val="A5A5A5"/>
-            </a:solidFill>
-            <a:prstDash val="solid"/>
-            <a:miter lim="800000"/>
-            <a:tailEnd type="triangle"/>
-          </a:ln>
-          <a:effectLst/>
-        </p:spPr>
-      </p:cxnSp>
-      <p:cxnSp>
-        <p:nvCxnSpPr>
-          <p:cNvPr id="95" name="Straight Arrow Connector 36">
-            <a:extLst>
-              <a:ext uri="{FF2B5EF4-FFF2-40B4-BE49-F238E27FC236}">
-                <a16:creationId xmlns:a16="http://schemas.microsoft.com/office/drawing/2014/main" id="{0B687128-90E4-A96E-C7A5-364F84CD2E40}"/>
-              </a:ext>
-            </a:extLst>
-          </p:cNvPr>
-          <p:cNvCxnSpPr>
-            <a:cxnSpLocks/>
-          </p:cNvCxnSpPr>
-          <p:nvPr/>
-        </p:nvCxnSpPr>
-        <p:spPr>
-          <a:xfrm>
-            <a:off x="4439976" y="3023269"/>
-            <a:ext cx="490860" cy="0"/>
-          </a:xfrm>
-          <a:prstGeom prst="straightConnector1">
-            <a:avLst/>
-          </a:prstGeom>
-          <a:noFill/>
-          <a:ln w="19050" cap="flat" cmpd="sng" algn="ctr">
-            <a:solidFill>
-              <a:srgbClr val="A5A5A5"/>
-            </a:solidFill>
-            <a:prstDash val="solid"/>
-            <a:miter lim="800000"/>
-            <a:tailEnd type="triangle"/>
-          </a:ln>
-          <a:effectLst/>
-        </p:spPr>
-      </p:cxnSp>
-      <p:cxnSp>
-        <p:nvCxnSpPr>
-          <p:cNvPr id="96" name="Straight Arrow Connector 37">
-            <a:extLst>
-              <a:ext uri="{FF2B5EF4-FFF2-40B4-BE49-F238E27FC236}">
-                <a16:creationId xmlns:a16="http://schemas.microsoft.com/office/drawing/2014/main" id="{8364A4DB-B075-1534-F61A-02CB288BB13D}"/>
-              </a:ext>
-            </a:extLst>
-          </p:cNvPr>
-          <p:cNvCxnSpPr>
-            <a:cxnSpLocks/>
-          </p:cNvCxnSpPr>
-          <p:nvPr/>
-        </p:nvCxnSpPr>
-        <p:spPr>
-          <a:xfrm>
-            <a:off x="6096000" y="3023269"/>
-            <a:ext cx="490860" cy="0"/>
-          </a:xfrm>
-          <a:prstGeom prst="straightConnector1">
-            <a:avLst/>
-          </a:prstGeom>
-          <a:noFill/>
-          <a:ln w="19050" cap="flat" cmpd="sng" algn="ctr">
-            <a:solidFill>
-              <a:srgbClr val="A5A5A5"/>
-            </a:solidFill>
-            <a:prstDash val="solid"/>
-            <a:miter lim="800000"/>
-            <a:tailEnd type="triangle"/>
-          </a:ln>
-          <a:effectLst/>
-        </p:spPr>
-      </p:cxnSp>
-      <p:cxnSp>
-        <p:nvCxnSpPr>
-          <p:cNvPr id="97" name="Straight Arrow Connector 38">
-            <a:extLst>
-              <a:ext uri="{FF2B5EF4-FFF2-40B4-BE49-F238E27FC236}">
-                <a16:creationId xmlns:a16="http://schemas.microsoft.com/office/drawing/2014/main" id="{6F954841-7111-7AD6-E6E2-0C1415557D70}"/>
-              </a:ext>
-            </a:extLst>
-          </p:cNvPr>
-          <p:cNvCxnSpPr>
-            <a:cxnSpLocks/>
-          </p:cNvCxnSpPr>
-          <p:nvPr/>
-        </p:nvCxnSpPr>
-        <p:spPr>
-          <a:xfrm>
-            <a:off x="6586860" y="3023269"/>
-            <a:ext cx="490860" cy="0"/>
-          </a:xfrm>
-          <a:prstGeom prst="straightConnector1">
-            <a:avLst/>
-          </a:prstGeom>
-          <a:noFill/>
-          <a:ln w="19050" cap="flat" cmpd="sng" algn="ctr">
-            <a:solidFill>
-              <a:srgbClr val="A5A5A5"/>
-            </a:solidFill>
-            <a:prstDash val="solid"/>
-            <a:miter lim="800000"/>
-            <a:tailEnd type="triangle"/>
-          </a:ln>
-          <a:effectLst/>
-        </p:spPr>
-      </p:cxnSp>
-      <p:cxnSp>
-        <p:nvCxnSpPr>
-          <p:cNvPr id="98" name="Straight Arrow Connector 39">
-            <a:extLst>
-              <a:ext uri="{FF2B5EF4-FFF2-40B4-BE49-F238E27FC236}">
-                <a16:creationId xmlns:a16="http://schemas.microsoft.com/office/drawing/2014/main" id="{00D6B5E8-054E-8DC7-BA61-708DABAA3C35}"/>
-              </a:ext>
-            </a:extLst>
-          </p:cNvPr>
-          <p:cNvCxnSpPr>
-            <a:cxnSpLocks/>
-          </p:cNvCxnSpPr>
-          <p:nvPr/>
-        </p:nvCxnSpPr>
-        <p:spPr>
-          <a:xfrm>
-            <a:off x="8247288" y="3023269"/>
-            <a:ext cx="490860" cy="0"/>
-          </a:xfrm>
-          <a:prstGeom prst="straightConnector1">
-            <a:avLst/>
-          </a:prstGeom>
-          <a:noFill/>
-          <a:ln w="19050" cap="flat" cmpd="sng" algn="ctr">
-            <a:solidFill>
-              <a:srgbClr val="A5A5A5"/>
-            </a:solidFill>
-            <a:prstDash val="solid"/>
-            <a:miter lim="800000"/>
-            <a:tailEnd type="triangle"/>
-          </a:ln>
-          <a:effectLst/>
-        </p:spPr>
-      </p:cxnSp>
-      <p:sp>
-        <p:nvSpPr>
-          <p:cNvPr id="99" name="TextBox 27">
-            <a:extLst>
-              <a:ext uri="{FF2B5EF4-FFF2-40B4-BE49-F238E27FC236}">
-                <a16:creationId xmlns:a16="http://schemas.microsoft.com/office/drawing/2014/main" id="{09F68A92-34D0-0F7B-83C3-8291D6DA4603}"/>
-              </a:ext>
-            </a:extLst>
-          </p:cNvPr>
-          <p:cNvSpPr txBox="1"/>
-          <p:nvPr/>
-        </p:nvSpPr>
-        <p:spPr>
-          <a:xfrm>
-            <a:off x="3271267" y="89549"/>
-            <a:ext cx="2052083" cy="646331"/>
-          </a:xfrm>
-          <a:prstGeom prst="rect">
-            <a:avLst/>
-          </a:prstGeom>
-          <a:noFill/>
-        </p:spPr>
-        <p:txBody>
-          <a:bodyPr wrap="square" rtlCol="0">
-            <a:spAutoFit/>
-          </a:bodyPr>
-          <a:lstStyle/>
-          <a:p>
-            <a:pPr marL="0" marR="0" lvl="0" indent="0" algn="ctr" defTabSz="914400" eaLnBrk="1" fontAlgn="auto" latinLnBrk="0" hangingPunct="1">
-              <a:lnSpc>
-                <a:spcPct val="100000"/>
-              </a:lnSpc>
-              <a:spcBef>
-                <a:spcPts val="0"/>
-              </a:spcBef>
-              <a:spcAft>
-                <a:spcPts val="0"/>
-              </a:spcAft>
-              <a:buClrTx/>
-              <a:buSzTx/>
-              <a:buFontTx/>
-              <a:buNone/>
-              <a:tabLst/>
-              <a:defRPr/>
-            </a:pPr>
-            <a:r>
-              <a:rPr kumimoji="0" lang="en-US" sz="1800" b="0" i="0" u="none" strike="noStrike" kern="0" cap="none" spc="0" normalizeH="0" baseline="0" noProof="0" dirty="0">
-                <a:ln>
-                  <a:noFill/>
-                </a:ln>
-                <a:solidFill>
-                  <a:prstClr val="black"/>
-                </a:solidFill>
-                <a:effectLst/>
-                <a:uLnTx/>
-                <a:uFillTx/>
-              </a:rPr>
-              <a:t>Secondary</a:t>
-            </a:r>
-          </a:p>
-          <a:p>
-            <a:pPr marL="0" marR="0" lvl="0" indent="0" algn="ctr" defTabSz="914400" eaLnBrk="1" fontAlgn="auto" latinLnBrk="0" hangingPunct="1">
-              <a:lnSpc>
-                <a:spcPct val="100000"/>
-              </a:lnSpc>
-              <a:spcBef>
-                <a:spcPts val="0"/>
-              </a:spcBef>
-              <a:spcAft>
-                <a:spcPts val="0"/>
-              </a:spcAft>
-              <a:buClrTx/>
-              <a:buSzTx/>
-              <a:buFontTx/>
-              <a:buNone/>
-              <a:tabLst/>
-              <a:defRPr/>
-            </a:pPr>
-            <a:r>
-              <a:rPr kumimoji="0" lang="en-US" sz="1800" b="0" i="0" u="none" strike="noStrike" kern="0" cap="none" spc="0" normalizeH="0" baseline="0" noProof="0" dirty="0">
-                <a:ln>
-                  <a:noFill/>
-                </a:ln>
-                <a:solidFill>
-                  <a:prstClr val="black"/>
-                </a:solidFill>
-                <a:effectLst/>
-                <a:uLnTx/>
-                <a:uFillTx/>
-              </a:rPr>
-              <a:t> Energy</a:t>
-            </a:r>
-            <a:endParaRPr kumimoji="0" lang="en-GB" sz="1800" b="0" i="0" u="none" strike="noStrike" kern="0" cap="none" spc="0" normalizeH="0" baseline="0" noProof="0" dirty="0">
-              <a:ln>
-                <a:noFill/>
-              </a:ln>
-              <a:solidFill>
-                <a:prstClr val="black"/>
-              </a:solidFill>
-              <a:effectLst/>
-              <a:uLnTx/>
-              <a:uFillTx/>
-            </a:endParaRPr>
-          </a:p>
-        </p:txBody>
-      </p:sp>
-      <p:sp>
-        <p:nvSpPr>
-          <p:cNvPr id="100" name="TextBox 28">
-            <a:extLst>
-              <a:ext uri="{FF2B5EF4-FFF2-40B4-BE49-F238E27FC236}">
-                <a16:creationId xmlns:a16="http://schemas.microsoft.com/office/drawing/2014/main" id="{B41E61B6-1083-6459-34A1-A528C96BCD82}"/>
-              </a:ext>
-            </a:extLst>
-          </p:cNvPr>
-          <p:cNvSpPr txBox="1"/>
-          <p:nvPr/>
-        </p:nvSpPr>
-        <p:spPr>
-          <a:xfrm>
-            <a:off x="5776274" y="89549"/>
-            <a:ext cx="2052083" cy="646331"/>
-          </a:xfrm>
-          <a:prstGeom prst="rect">
-            <a:avLst/>
-          </a:prstGeom>
-          <a:noFill/>
-        </p:spPr>
-        <p:txBody>
-          <a:bodyPr wrap="square" rtlCol="0">
-            <a:spAutoFit/>
-          </a:bodyPr>
-          <a:lstStyle/>
-          <a:p>
-            <a:pPr marL="0" marR="0" lvl="0" indent="0" algn="ctr" defTabSz="914400" eaLnBrk="1" fontAlgn="auto" latinLnBrk="0" hangingPunct="1">
-              <a:lnSpc>
-                <a:spcPct val="100000"/>
-              </a:lnSpc>
-              <a:spcBef>
-                <a:spcPts val="0"/>
-              </a:spcBef>
-              <a:spcAft>
-                <a:spcPts val="0"/>
-              </a:spcAft>
-              <a:buClrTx/>
-              <a:buSzTx/>
-              <a:buFontTx/>
-              <a:buNone/>
-              <a:tabLst/>
-              <a:defRPr/>
-            </a:pPr>
-            <a:r>
-              <a:rPr kumimoji="0" lang="en-US" sz="1800" b="0" i="0" u="none" strike="noStrike" kern="0" cap="none" spc="0" normalizeH="0" baseline="0" noProof="0" dirty="0">
-                <a:ln>
-                  <a:noFill/>
-                </a:ln>
-                <a:solidFill>
-                  <a:prstClr val="black"/>
-                </a:solidFill>
-                <a:effectLst/>
-                <a:uLnTx/>
-                <a:uFillTx/>
-              </a:rPr>
-              <a:t>Final</a:t>
-            </a:r>
-          </a:p>
-          <a:p>
-            <a:pPr marL="0" marR="0" lvl="0" indent="0" algn="ctr" defTabSz="914400" eaLnBrk="1" fontAlgn="auto" latinLnBrk="0" hangingPunct="1">
-              <a:lnSpc>
-                <a:spcPct val="100000"/>
-              </a:lnSpc>
-              <a:spcBef>
-                <a:spcPts val="0"/>
-              </a:spcBef>
-              <a:spcAft>
-                <a:spcPts val="0"/>
-              </a:spcAft>
-              <a:buClrTx/>
-              <a:buSzTx/>
-              <a:buFontTx/>
-              <a:buNone/>
-              <a:tabLst/>
-              <a:defRPr/>
-            </a:pPr>
-            <a:r>
-              <a:rPr kumimoji="0" lang="en-US" sz="1800" b="0" i="0" u="none" strike="noStrike" kern="0" cap="none" spc="0" normalizeH="0" baseline="0" noProof="0" dirty="0">
-                <a:ln>
-                  <a:noFill/>
-                </a:ln>
-                <a:solidFill>
-                  <a:prstClr val="black"/>
-                </a:solidFill>
-                <a:effectLst/>
-                <a:uLnTx/>
-                <a:uFillTx/>
-              </a:rPr>
-              <a:t> Energy</a:t>
-            </a:r>
-            <a:endParaRPr kumimoji="0" lang="en-GB" sz="1800" b="0" i="0" u="none" strike="noStrike" kern="0" cap="none" spc="0" normalizeH="0" baseline="0" noProof="0" dirty="0">
-              <a:ln>
-                <a:noFill/>
-              </a:ln>
-              <a:solidFill>
-                <a:prstClr val="black"/>
-              </a:solidFill>
-              <a:effectLst/>
-              <a:uLnTx/>
-              <a:uFillTx/>
-            </a:endParaRPr>
-          </a:p>
-        </p:txBody>
-      </p:sp>
-      <p:sp>
-        <p:nvSpPr>
-          <p:cNvPr id="101" name="TextBox 30">
-            <a:extLst>
-              <a:ext uri="{FF2B5EF4-FFF2-40B4-BE49-F238E27FC236}">
-                <a16:creationId xmlns:a16="http://schemas.microsoft.com/office/drawing/2014/main" id="{2D9733DD-504F-C37D-5374-2400D24D4B91}"/>
-              </a:ext>
-            </a:extLst>
-          </p:cNvPr>
-          <p:cNvSpPr txBox="1"/>
-          <p:nvPr/>
-        </p:nvSpPr>
-        <p:spPr>
-          <a:xfrm>
-            <a:off x="7841528" y="103706"/>
-            <a:ext cx="2052083" cy="646331"/>
-          </a:xfrm>
-          <a:prstGeom prst="rect">
-            <a:avLst/>
-          </a:prstGeom>
-          <a:noFill/>
-        </p:spPr>
-        <p:txBody>
-          <a:bodyPr wrap="square" rtlCol="0">
-            <a:spAutoFit/>
-          </a:bodyPr>
-          <a:lstStyle/>
-          <a:p>
-            <a:pPr marL="0" marR="0" lvl="0" indent="0" algn="ctr" defTabSz="914400" eaLnBrk="1" fontAlgn="auto" latinLnBrk="0" hangingPunct="1">
-              <a:lnSpc>
-                <a:spcPct val="100000"/>
-              </a:lnSpc>
-              <a:spcBef>
-                <a:spcPts val="0"/>
-              </a:spcBef>
-              <a:spcAft>
-                <a:spcPts val="0"/>
-              </a:spcAft>
-              <a:buClrTx/>
-              <a:buSzTx/>
-              <a:buFontTx/>
-              <a:buNone/>
-              <a:tabLst/>
-              <a:defRPr/>
-            </a:pPr>
-            <a:r>
-              <a:rPr kumimoji="0" lang="en-US" sz="1800" b="0" i="0" u="none" strike="noStrike" kern="0" cap="none" spc="0" normalizeH="0" baseline="0" noProof="0" dirty="0">
-                <a:ln>
-                  <a:noFill/>
-                </a:ln>
-                <a:solidFill>
-                  <a:prstClr val="black"/>
-                </a:solidFill>
-                <a:effectLst/>
-                <a:uLnTx/>
-                <a:uFillTx/>
-              </a:rPr>
-              <a:t>Useful</a:t>
-            </a:r>
-          </a:p>
-          <a:p>
-            <a:pPr marL="0" marR="0" lvl="0" indent="0" algn="ctr" defTabSz="914400" eaLnBrk="1" fontAlgn="auto" latinLnBrk="0" hangingPunct="1">
-              <a:lnSpc>
-                <a:spcPct val="100000"/>
-              </a:lnSpc>
-              <a:spcBef>
-                <a:spcPts val="0"/>
-              </a:spcBef>
-              <a:spcAft>
-                <a:spcPts val="0"/>
-              </a:spcAft>
-              <a:buClrTx/>
-              <a:buSzTx/>
-              <a:buFontTx/>
-              <a:buNone/>
-              <a:tabLst/>
-              <a:defRPr/>
-            </a:pPr>
-            <a:r>
-              <a:rPr kumimoji="0" lang="en-US" sz="1800" b="0" i="0" u="none" strike="noStrike" kern="0" cap="none" spc="0" normalizeH="0" baseline="0" noProof="0" dirty="0">
-                <a:ln>
-                  <a:noFill/>
-                </a:ln>
-                <a:solidFill>
-                  <a:prstClr val="black"/>
-                </a:solidFill>
-                <a:effectLst/>
-                <a:uLnTx/>
-                <a:uFillTx/>
-              </a:rPr>
-              <a:t> Energy</a:t>
-            </a:r>
-            <a:endParaRPr kumimoji="0" lang="en-GB" sz="1800" b="0" i="0" u="none" strike="noStrike" kern="0" cap="none" spc="0" normalizeH="0" baseline="0" noProof="0" dirty="0">
-              <a:ln>
-                <a:noFill/>
-              </a:ln>
-              <a:solidFill>
-                <a:prstClr val="black"/>
-              </a:solidFill>
-              <a:effectLst/>
-              <a:uLnTx/>
-              <a:uFillTx/>
-            </a:endParaRPr>
-          </a:p>
-        </p:txBody>
-      </p:sp>
-      <p:sp>
-        <p:nvSpPr>
-          <p:cNvPr id="103" name="Rectangle: Rounded Corners 26">
-            <a:extLst>
-              <a:ext uri="{FF2B5EF4-FFF2-40B4-BE49-F238E27FC236}">
-                <a16:creationId xmlns:a16="http://schemas.microsoft.com/office/drawing/2014/main" id="{B214F4C7-8353-92F4-B217-FCBEA608425E}"/>
-              </a:ext>
-            </a:extLst>
-          </p:cNvPr>
-          <p:cNvSpPr/>
-          <p:nvPr/>
-        </p:nvSpPr>
-        <p:spPr>
-          <a:xfrm>
-            <a:off x="9248504" y="2699220"/>
-            <a:ext cx="1167812" cy="648098"/>
-          </a:xfrm>
-          <a:prstGeom prst="roundRect">
-            <a:avLst/>
-          </a:prstGeom>
-          <a:solidFill>
-            <a:srgbClr val="FFC000">
-              <a:lumMod val="60000"/>
-              <a:lumOff val="40000"/>
-            </a:srgbClr>
-          </a:solidFill>
-          <a:ln w="12700" cap="flat" cmpd="sng" algn="ctr">
-            <a:solidFill>
-              <a:srgbClr val="4472C4">
-                <a:shade val="50000"/>
-              </a:srgbClr>
-            </a:solidFill>
-            <a:prstDash val="solid"/>
-            <a:miter lim="800000"/>
-          </a:ln>
-          <a:effectLst>
-            <a:outerShdw blurRad="50800" dist="38100" dir="2700000" algn="tl" rotWithShape="0">
-              <a:prstClr val="black">
-                <a:alpha val="40000"/>
-              </a:prstClr>
-            </a:outerShdw>
-          </a:effectLst>
-        </p:spPr>
-        <p:txBody>
-          <a:bodyPr rtlCol="0" anchor="ctr"/>
-          <a:lstStyle/>
-          <a:p>
-            <a:pPr marL="0" marR="0" lvl="0" indent="0" algn="ctr" defTabSz="914400" eaLnBrk="1" fontAlgn="auto" latinLnBrk="0" hangingPunct="1">
-              <a:lnSpc>
-                <a:spcPct val="100000"/>
-              </a:lnSpc>
-              <a:spcBef>
-                <a:spcPts val="0"/>
-              </a:spcBef>
-              <a:spcAft>
-                <a:spcPts val="0"/>
-              </a:spcAft>
-              <a:buClrTx/>
-              <a:buSzTx/>
-              <a:buFontTx/>
-              <a:buNone/>
-              <a:tabLst/>
-              <a:defRPr/>
-            </a:pPr>
-            <a:r>
-              <a:rPr kumimoji="0" lang="en-US" sz="1400" b="0" i="0" u="none" strike="noStrike" kern="0" cap="none" spc="0" normalizeH="0" baseline="0" noProof="0" dirty="0">
-                <a:ln>
-                  <a:noFill/>
-                </a:ln>
-                <a:solidFill>
-                  <a:srgbClr val="44546A"/>
-                </a:solidFill>
-                <a:effectLst/>
-                <a:uLnTx/>
-                <a:uFillTx/>
-                <a:latin typeface="Calibri" panose="020F0502020204030204"/>
-                <a:ea typeface="+mn-ea"/>
-                <a:cs typeface="+mn-cs"/>
-              </a:rPr>
-              <a:t>Lightning</a:t>
-            </a:r>
-            <a:endParaRPr kumimoji="0" lang="en-GB" sz="1400" b="0" i="0" u="none" strike="noStrike" kern="0" cap="none" spc="0" normalizeH="0" baseline="0" noProof="0" dirty="0">
-              <a:ln>
-                <a:noFill/>
-              </a:ln>
-              <a:solidFill>
-                <a:srgbClr val="44546A"/>
-              </a:solidFill>
-              <a:effectLst/>
-              <a:uLnTx/>
-              <a:uFillTx/>
-              <a:latin typeface="Calibri" panose="020F0502020204030204"/>
-              <a:ea typeface="+mn-ea"/>
-              <a:cs typeface="+mn-cs"/>
-            </a:endParaRPr>
-          </a:p>
-        </p:txBody>
-      </p:sp>
-      <p:cxnSp>
-        <p:nvCxnSpPr>
-          <p:cNvPr id="104" name="Straight Connector 29">
-            <a:extLst>
-              <a:ext uri="{FF2B5EF4-FFF2-40B4-BE49-F238E27FC236}">
-                <a16:creationId xmlns:a16="http://schemas.microsoft.com/office/drawing/2014/main" id="{7281E7D0-FAA8-77FA-5F2B-FF855991BF77}"/>
-              </a:ext>
-            </a:extLst>
-          </p:cNvPr>
-          <p:cNvCxnSpPr>
-            <a:cxnSpLocks/>
-          </p:cNvCxnSpPr>
-          <p:nvPr/>
-        </p:nvCxnSpPr>
-        <p:spPr>
-          <a:xfrm>
-            <a:off x="10912527" y="1417673"/>
-            <a:ext cx="0" cy="4848446"/>
-          </a:xfrm>
-          <a:prstGeom prst="line">
-            <a:avLst/>
-          </a:prstGeom>
-          <a:noFill/>
-          <a:ln w="19050" cap="flat" cmpd="sng" algn="ctr">
-            <a:solidFill>
-              <a:srgbClr val="A5A5A5"/>
-            </a:solidFill>
-            <a:prstDash val="solid"/>
-            <a:miter lim="800000"/>
-          </a:ln>
-          <a:effectLst/>
-        </p:spPr>
-      </p:cxnSp>
-      <p:sp>
-        <p:nvSpPr>
-          <p:cNvPr id="105" name="TextBox 33">
-            <a:extLst>
-              <a:ext uri="{FF2B5EF4-FFF2-40B4-BE49-F238E27FC236}">
-                <a16:creationId xmlns:a16="http://schemas.microsoft.com/office/drawing/2014/main" id="{3A654A2F-4B55-B861-F357-0B46312EBF19}"/>
-              </a:ext>
-            </a:extLst>
-          </p:cNvPr>
-          <p:cNvSpPr txBox="1"/>
-          <p:nvPr/>
-        </p:nvSpPr>
-        <p:spPr>
-          <a:xfrm rot="16200000">
-            <a:off x="10077433" y="5380918"/>
-            <a:ext cx="1446028" cy="338554"/>
-          </a:xfrm>
-          <a:prstGeom prst="rect">
-            <a:avLst/>
-          </a:prstGeom>
-          <a:noFill/>
-        </p:spPr>
-        <p:txBody>
-          <a:bodyPr wrap="square" rtlCol="0">
-            <a:spAutoFit/>
-          </a:bodyPr>
-          <a:lstStyle/>
-          <a:p>
-            <a:pPr marL="0" marR="0" lvl="0" indent="0" defTabSz="914400" eaLnBrk="1" fontAlgn="auto" latinLnBrk="0" hangingPunct="1">
-              <a:lnSpc>
-                <a:spcPct val="100000"/>
-              </a:lnSpc>
-              <a:spcBef>
-                <a:spcPts val="0"/>
-              </a:spcBef>
-              <a:spcAft>
-                <a:spcPts val="0"/>
-              </a:spcAft>
-              <a:buClrTx/>
-              <a:buSzTx/>
-              <a:buFontTx/>
-              <a:buNone/>
-              <a:tabLst/>
-              <a:defRPr/>
-            </a:pPr>
-            <a:r>
-              <a:rPr kumimoji="0" lang="en-US" sz="1600" b="0" i="1" u="none" strike="noStrike" kern="0" cap="none" spc="0" normalizeH="0" baseline="0" noProof="0" dirty="0">
-                <a:ln>
-                  <a:noFill/>
-                </a:ln>
-                <a:solidFill>
-                  <a:prstClr val="black"/>
-                </a:solidFill>
-                <a:effectLst/>
-                <a:uLnTx/>
-                <a:uFillTx/>
-              </a:rPr>
-              <a:t>light</a:t>
-            </a:r>
-            <a:endParaRPr kumimoji="0" lang="en-GB" sz="1600" b="0" i="1" u="none" strike="noStrike" kern="0" cap="none" spc="0" normalizeH="0" baseline="0" noProof="0" dirty="0">
-              <a:ln>
-                <a:noFill/>
-              </a:ln>
-              <a:solidFill>
-                <a:prstClr val="black"/>
-              </a:solidFill>
-              <a:effectLst/>
-              <a:uLnTx/>
-              <a:uFillTx/>
-            </a:endParaRPr>
-          </a:p>
-        </p:txBody>
-      </p:sp>
-      <p:cxnSp>
-        <p:nvCxnSpPr>
-          <p:cNvPr id="106" name="Straight Arrow Connector 38">
-            <a:extLst>
-              <a:ext uri="{FF2B5EF4-FFF2-40B4-BE49-F238E27FC236}">
-                <a16:creationId xmlns:a16="http://schemas.microsoft.com/office/drawing/2014/main" id="{C44D8DF7-CAD3-C20B-144E-DCE6E069FB1B}"/>
-              </a:ext>
-            </a:extLst>
-          </p:cNvPr>
-          <p:cNvCxnSpPr>
-            <a:cxnSpLocks/>
-          </p:cNvCxnSpPr>
-          <p:nvPr/>
-        </p:nvCxnSpPr>
-        <p:spPr>
-          <a:xfrm>
-            <a:off x="8755888" y="3023269"/>
-            <a:ext cx="490860" cy="0"/>
-          </a:xfrm>
-          <a:prstGeom prst="straightConnector1">
-            <a:avLst/>
-          </a:prstGeom>
-          <a:noFill/>
-          <a:ln w="19050" cap="flat" cmpd="sng" algn="ctr">
-            <a:solidFill>
-              <a:srgbClr val="A5A5A5"/>
-            </a:solidFill>
-            <a:prstDash val="solid"/>
-            <a:miter lim="800000"/>
-            <a:tailEnd type="triangle"/>
-          </a:ln>
-          <a:effectLst/>
-        </p:spPr>
-      </p:cxnSp>
-      <p:cxnSp>
-        <p:nvCxnSpPr>
-          <p:cNvPr id="107" name="Straight Arrow Connector 39">
-            <a:extLst>
-              <a:ext uri="{FF2B5EF4-FFF2-40B4-BE49-F238E27FC236}">
-                <a16:creationId xmlns:a16="http://schemas.microsoft.com/office/drawing/2014/main" id="{61629CA6-B591-E395-A439-74DB0A88B242}"/>
-              </a:ext>
-            </a:extLst>
-          </p:cNvPr>
-          <p:cNvCxnSpPr>
-            <a:cxnSpLocks/>
-          </p:cNvCxnSpPr>
-          <p:nvPr/>
-        </p:nvCxnSpPr>
-        <p:spPr>
-          <a:xfrm>
-            <a:off x="10416316" y="3023269"/>
-            <a:ext cx="490860" cy="0"/>
-          </a:xfrm>
-          <a:prstGeom prst="straightConnector1">
-            <a:avLst/>
-          </a:prstGeom>
-          <a:noFill/>
-          <a:ln w="19050" cap="flat" cmpd="sng" algn="ctr">
-            <a:solidFill>
-              <a:srgbClr val="A5A5A5"/>
-            </a:solidFill>
-            <a:prstDash val="solid"/>
-            <a:miter lim="800000"/>
-            <a:tailEnd type="triangle"/>
-          </a:ln>
-          <a:effectLst/>
-        </p:spPr>
-      </p:cxnSp>
-      <p:sp>
-        <p:nvSpPr>
-          <p:cNvPr id="108" name="TextBox 30">
-            <a:extLst>
-              <a:ext uri="{FF2B5EF4-FFF2-40B4-BE49-F238E27FC236}">
-                <a16:creationId xmlns:a16="http://schemas.microsoft.com/office/drawing/2014/main" id="{7A56EC41-8554-FB29-1428-1A076A0B12E4}"/>
-              </a:ext>
-            </a:extLst>
-          </p:cNvPr>
-          <p:cNvSpPr txBox="1"/>
-          <p:nvPr/>
-        </p:nvSpPr>
-        <p:spPr>
-          <a:xfrm>
-            <a:off x="10010556" y="103706"/>
-            <a:ext cx="2052083" cy="646331"/>
-          </a:xfrm>
-          <a:prstGeom prst="rect">
-            <a:avLst/>
-          </a:prstGeom>
-          <a:noFill/>
-        </p:spPr>
-        <p:txBody>
-          <a:bodyPr wrap="square" rtlCol="0">
-            <a:spAutoFit/>
-          </a:bodyPr>
-          <a:lstStyle/>
-          <a:p>
-            <a:pPr marL="0" marR="0" lvl="0" indent="0" algn="ctr" defTabSz="914400" eaLnBrk="1" fontAlgn="auto" latinLnBrk="0" hangingPunct="1">
-              <a:lnSpc>
-                <a:spcPct val="100000"/>
-              </a:lnSpc>
-              <a:spcBef>
-                <a:spcPts val="0"/>
-              </a:spcBef>
-              <a:spcAft>
-                <a:spcPts val="0"/>
-              </a:spcAft>
-              <a:buClrTx/>
-              <a:buSzTx/>
-              <a:buFontTx/>
-              <a:buNone/>
-              <a:tabLst/>
-              <a:defRPr/>
-            </a:pPr>
-            <a:r>
-              <a:rPr kumimoji="0" lang="en-US" sz="1800" b="0" i="0" u="none" strike="noStrike" kern="0" cap="none" spc="0" normalizeH="0" baseline="0" noProof="0" dirty="0">
-                <a:ln>
-                  <a:noFill/>
-                </a:ln>
-                <a:solidFill>
-                  <a:prstClr val="black"/>
-                </a:solidFill>
-                <a:effectLst/>
-                <a:uLnTx/>
-                <a:uFillTx/>
-              </a:rPr>
-              <a:t>Useful</a:t>
-            </a:r>
-          </a:p>
-          <a:p>
-            <a:pPr marL="0" marR="0" lvl="0" indent="0" algn="ctr" defTabSz="914400" eaLnBrk="1" fontAlgn="auto" latinLnBrk="0" hangingPunct="1">
-              <a:lnSpc>
-                <a:spcPct val="100000"/>
-              </a:lnSpc>
-              <a:spcBef>
-                <a:spcPts val="0"/>
-              </a:spcBef>
-              <a:spcAft>
-                <a:spcPts val="0"/>
-              </a:spcAft>
-              <a:buClrTx/>
-              <a:buSzTx/>
-              <a:buFontTx/>
-              <a:buNone/>
-              <a:tabLst/>
-              <a:defRPr/>
-            </a:pPr>
-            <a:r>
-              <a:rPr kumimoji="0" lang="en-US" sz="1800" b="0" i="0" u="none" strike="noStrike" kern="0" cap="none" spc="0" normalizeH="0" baseline="0" noProof="0" dirty="0">
-                <a:ln>
-                  <a:noFill/>
-                </a:ln>
-                <a:solidFill>
-                  <a:prstClr val="black"/>
-                </a:solidFill>
-                <a:effectLst/>
-                <a:uLnTx/>
-                <a:uFillTx/>
-              </a:rPr>
-              <a:t> Energy</a:t>
-            </a:r>
-            <a:endParaRPr kumimoji="0" lang="en-GB" sz="1800" b="0" i="0" u="none" strike="noStrike" kern="0" cap="none" spc="0" normalizeH="0" baseline="0" noProof="0" dirty="0">
-              <a:ln>
-                <a:noFill/>
-              </a:ln>
-              <a:solidFill>
-                <a:prstClr val="black"/>
-              </a:solidFill>
-              <a:effectLst/>
-              <a:uLnTx/>
-              <a:uFillTx/>
-            </a:endParaRPr>
-          </a:p>
-        </p:txBody>
-      </p:sp>
-    </p:spTree>
-    <p:extLst>
-      <p:ext uri="{BB962C8B-B14F-4D97-AF65-F5344CB8AC3E}">
-        <p14:creationId xmlns:p14="http://schemas.microsoft.com/office/powerpoint/2010/main" val="3597963014"/>
+        <p14:creationId xmlns:p14="http://schemas.microsoft.com/office/powerpoint/2010/main" val="3156359377"/>
       </p:ext>
     </p:extLst>
   </p:cSld>

</xml_diff>